<commit_message>
Added inference results on remaining test dataset
</commit_message>
<xml_diff>
--- a/ds01_report.pptx
+++ b/ds01_report.pptx
@@ -18,7 +18,11 @@
     <p:sldId id="265" r:id="rId12"/>
     <p:sldId id="267" r:id="rId13"/>
     <p:sldId id="268" r:id="rId14"/>
-    <p:sldId id="266" r:id="rId15"/>
+    <p:sldId id="270" r:id="rId15"/>
+    <p:sldId id="271" r:id="rId16"/>
+    <p:sldId id="272" r:id="rId17"/>
+    <p:sldId id="273" r:id="rId18"/>
+    <p:sldId id="266" r:id="rId19"/>
   </p:sldIdLst>
   <p:sldSz cx="12192000" cy="6858000"/>
   <p:notesSz cx="6858000" cy="9144000"/>
@@ -117,6 +121,11 @@
       </a:defRPr>
     </a:lvl9pPr>
   </p:defaultTextStyle>
+  <p:extLst>
+    <p:ext uri="{EFAFB233-063F-42B5-8137-9DF3F51BA10A}">
+      <p15:sldGuideLst xmlns:p15="http://schemas.microsoft.com/office/powerpoint/2012/main"/>
+    </p:ext>
+  </p:extLst>
 </p:presentation>
 </file>
 
@@ -3423,7 +3432,7 @@
             <a:pPr algn="ctr"/>
             <a:r>
               <a:rPr lang="en-SG" sz="2800" b="1" dirty="0"/>
-              <a:t>Gregory Lim Guowei</a:t>
+              <a:t>Gregory Lim</a:t>
             </a:r>
           </a:p>
           <a:p>
@@ -7288,6 +7297,2472 @@
 </file>
 
 <file path=ppt/slides/slide14.xml><?xml version="1.0" encoding="utf-8"?>
+<p:sld xmlns:a="http://schemas.openxmlformats.org/drawingml/2006/main" xmlns:r="http://schemas.openxmlformats.org/officeDocument/2006/relationships" xmlns:p="http://schemas.openxmlformats.org/presentationml/2006/main">
+  <p:cSld>
+    <p:spTree>
+      <p:nvGrpSpPr>
+        <p:cNvPr id="1" name=""/>
+        <p:cNvGrpSpPr/>
+        <p:nvPr/>
+      </p:nvGrpSpPr>
+      <p:grpSpPr>
+        <a:xfrm>
+          <a:off x="0" y="0"/>
+          <a:ext cx="0" cy="0"/>
+          <a:chOff x="0" y="0"/>
+          <a:chExt cx="0" cy="0"/>
+        </a:xfrm>
+      </p:grpSpPr>
+      <p:sp>
+        <p:nvSpPr>
+          <p:cNvPr id="5" name="TextBox 4">
+            <a:extLst>
+              <a:ext uri="{FF2B5EF4-FFF2-40B4-BE49-F238E27FC236}">
+                <a16:creationId xmlns:a16="http://schemas.microsoft.com/office/drawing/2014/main" id="{13BEAA79-A8D6-45DE-B737-2BB38ECE669C}"/>
+              </a:ext>
+            </a:extLst>
+          </p:cNvPr>
+          <p:cNvSpPr txBox="1"/>
+          <p:nvPr/>
+        </p:nvSpPr>
+        <p:spPr>
+          <a:xfrm>
+            <a:off x="202242" y="89566"/>
+            <a:ext cx="4504545" cy="461665"/>
+          </a:xfrm>
+          <a:prstGeom prst="rect">
+            <a:avLst/>
+          </a:prstGeom>
+          <a:noFill/>
+        </p:spPr>
+        <p:txBody>
+          <a:bodyPr wrap="square" rtlCol="0">
+            <a:spAutoFit/>
+          </a:bodyPr>
+          <a:lstStyle/>
+          <a:p>
+            <a:r>
+              <a:rPr lang="en-US" sz="2400" b="1" dirty="0"/>
+              <a:t>Results</a:t>
+            </a:r>
+            <a:endParaRPr lang="en-SG" sz="2400" b="1" dirty="0"/>
+          </a:p>
+        </p:txBody>
+      </p:sp>
+      <p:graphicFrame>
+        <p:nvGraphicFramePr>
+          <p:cNvPr id="12" name="Table 5">
+            <a:extLst>
+              <a:ext uri="{FF2B5EF4-FFF2-40B4-BE49-F238E27FC236}">
+                <a16:creationId xmlns:a16="http://schemas.microsoft.com/office/drawing/2014/main" id="{A0DD485C-18A7-49BA-802C-A32185B71FDD}"/>
+              </a:ext>
+            </a:extLst>
+          </p:cNvPr>
+          <p:cNvGraphicFramePr>
+            <a:graphicFrameLocks noGrp="1"/>
+          </p:cNvGraphicFramePr>
+          <p:nvPr>
+            <p:extLst>
+              <p:ext uri="{D42A27DB-BD31-4B8C-83A1-F6EECF244321}">
+                <p14:modId xmlns:p14="http://schemas.microsoft.com/office/powerpoint/2010/main" val="1819546278"/>
+              </p:ext>
+            </p:extLst>
+          </p:nvPr>
+        </p:nvGraphicFramePr>
+        <p:xfrm>
+          <a:off x="1620983" y="950658"/>
+          <a:ext cx="8395854" cy="3467480"/>
+        </p:xfrm>
+        <a:graphic>
+          <a:graphicData uri="http://schemas.openxmlformats.org/drawingml/2006/table">
+            <a:tbl>
+              <a:tblPr firstRow="1" bandRow="1">
+                <a:tableStyleId>{2D5ABB26-0587-4C30-8999-92F81FD0307C}</a:tableStyleId>
+              </a:tblPr>
+              <a:tblGrid>
+                <a:gridCol w="5527963">
+                  <a:extLst>
+                    <a:ext uri="{9D8B030D-6E8A-4147-A177-3AD203B41FA5}">
+                      <a16:colId xmlns:a16="http://schemas.microsoft.com/office/drawing/2014/main" val="3423051073"/>
+                    </a:ext>
+                  </a:extLst>
+                </a:gridCol>
+                <a:gridCol w="2867891">
+                  <a:extLst>
+                    <a:ext uri="{9D8B030D-6E8A-4147-A177-3AD203B41FA5}">
+                      <a16:colId xmlns:a16="http://schemas.microsoft.com/office/drawing/2014/main" val="1531487635"/>
+                    </a:ext>
+                  </a:extLst>
+                </a:gridCol>
+              </a:tblGrid>
+              <a:tr h="312877">
+                <a:tc>
+                  <a:txBody>
+                    <a:bodyPr/>
+                    <a:lstStyle/>
+                    <a:p>
+                      <a:pPr marL="0" marR="0" lvl="0" indent="0" algn="l" defTabSz="914400" rtl="0" eaLnBrk="1" fontAlgn="auto" latinLnBrk="0" hangingPunct="1">
+                        <a:lnSpc>
+                          <a:spcPct val="100000"/>
+                        </a:lnSpc>
+                        <a:spcBef>
+                          <a:spcPts val="0"/>
+                        </a:spcBef>
+                        <a:spcAft>
+                          <a:spcPts val="0"/>
+                        </a:spcAft>
+                        <a:buClrTx/>
+                        <a:buSzTx/>
+                        <a:buFontTx/>
+                        <a:buNone/>
+                        <a:tabLst/>
+                        <a:defRPr/>
+                      </a:pPr>
+                      <a:r>
+                        <a:rPr lang="en-SG" sz="1600" b="1" dirty="0"/>
+                        <a:t>Data files</a:t>
+                      </a:r>
+                    </a:p>
+                  </a:txBody>
+                  <a:tcPr>
+                    <a:lnL w="12700" cap="flat" cmpd="sng" algn="ctr">
+                      <a:solidFill>
+                        <a:schemeClr val="tx1"/>
+                      </a:solidFill>
+                      <a:prstDash val="solid"/>
+                      <a:round/>
+                      <a:headEnd type="none" w="med" len="med"/>
+                      <a:tailEnd type="none" w="med" len="med"/>
+                    </a:lnL>
+                    <a:lnR w="12700" cap="flat" cmpd="sng" algn="ctr">
+                      <a:solidFill>
+                        <a:schemeClr val="tx1"/>
+                      </a:solidFill>
+                      <a:prstDash val="solid"/>
+                      <a:round/>
+                      <a:headEnd type="none" w="med" len="med"/>
+                      <a:tailEnd type="none" w="med" len="med"/>
+                    </a:lnR>
+                    <a:lnT w="12700" cap="flat" cmpd="sng" algn="ctr">
+                      <a:solidFill>
+                        <a:schemeClr val="tx1"/>
+                      </a:solidFill>
+                      <a:prstDash val="solid"/>
+                      <a:round/>
+                      <a:headEnd type="none" w="med" len="med"/>
+                      <a:tailEnd type="none" w="med" len="med"/>
+                    </a:lnT>
+                    <a:lnB w="12700" cap="flat" cmpd="sng" algn="ctr">
+                      <a:solidFill>
+                        <a:schemeClr val="tx1"/>
+                      </a:solidFill>
+                      <a:prstDash val="solid"/>
+                      <a:round/>
+                      <a:headEnd type="none" w="med" len="med"/>
+                      <a:tailEnd type="none" w="med" len="med"/>
+                    </a:lnB>
+                  </a:tcPr>
+                </a:tc>
+                <a:tc>
+                  <a:txBody>
+                    <a:bodyPr/>
+                    <a:lstStyle/>
+                    <a:p>
+                      <a:pPr marL="0" marR="0" lvl="0" indent="0" algn="l" defTabSz="914400" rtl="0" eaLnBrk="1" fontAlgn="auto" latinLnBrk="0" hangingPunct="1">
+                        <a:lnSpc>
+                          <a:spcPct val="100000"/>
+                        </a:lnSpc>
+                        <a:spcBef>
+                          <a:spcPts val="0"/>
+                        </a:spcBef>
+                        <a:spcAft>
+                          <a:spcPts val="0"/>
+                        </a:spcAft>
+                        <a:buClrTx/>
+                        <a:buSzTx/>
+                        <a:buFontTx/>
+                        <a:buNone/>
+                        <a:tabLst/>
+                        <a:defRPr/>
+                      </a:pPr>
+                      <a:r>
+                        <a:rPr lang="en-SG" sz="1600" b="1" dirty="0"/>
+                        <a:t>Root mean squared error</a:t>
+                      </a:r>
+                    </a:p>
+                  </a:txBody>
+                  <a:tcPr>
+                    <a:lnL w="12700" cap="flat" cmpd="sng" algn="ctr">
+                      <a:solidFill>
+                        <a:schemeClr val="tx1"/>
+                      </a:solidFill>
+                      <a:prstDash val="solid"/>
+                      <a:round/>
+                      <a:headEnd type="none" w="med" len="med"/>
+                      <a:tailEnd type="none" w="med" len="med"/>
+                    </a:lnL>
+                    <a:lnR w="12700" cap="flat" cmpd="sng" algn="ctr">
+                      <a:solidFill>
+                        <a:schemeClr val="tx1"/>
+                      </a:solidFill>
+                      <a:prstDash val="solid"/>
+                      <a:round/>
+                      <a:headEnd type="none" w="med" len="med"/>
+                      <a:tailEnd type="none" w="med" len="med"/>
+                    </a:lnR>
+                    <a:lnT w="12700" cap="flat" cmpd="sng" algn="ctr">
+                      <a:solidFill>
+                        <a:schemeClr val="tx1"/>
+                      </a:solidFill>
+                      <a:prstDash val="solid"/>
+                      <a:round/>
+                      <a:headEnd type="none" w="med" len="med"/>
+                      <a:tailEnd type="none" w="med" len="med"/>
+                    </a:lnT>
+                    <a:lnB w="12700" cap="flat" cmpd="sng" algn="ctr">
+                      <a:solidFill>
+                        <a:schemeClr val="tx1"/>
+                      </a:solidFill>
+                      <a:prstDash val="solid"/>
+                      <a:round/>
+                      <a:headEnd type="none" w="med" len="med"/>
+                      <a:tailEnd type="none" w="med" len="med"/>
+                    </a:lnB>
+                  </a:tcPr>
+                </a:tc>
+                <a:extLst>
+                  <a:ext uri="{0D108BD9-81ED-4DB2-BD59-A6C34878D82A}">
+                    <a16:rowId xmlns:a16="http://schemas.microsoft.com/office/drawing/2014/main" val="3046254628"/>
+                  </a:ext>
+                </a:extLst>
+              </a:tr>
+              <a:tr h="412833">
+                <a:tc>
+                  <a:txBody>
+                    <a:bodyPr/>
+                    <a:lstStyle/>
+                    <a:p>
+                      <a:r>
+                        <a:rPr lang="en-SG" sz="1600" dirty="0"/>
+                        <a:t>N-CAMPSS_DS01-005.h5 </a:t>
+                      </a:r>
+                    </a:p>
+                    <a:p>
+                      <a:r>
+                        <a:rPr lang="en-SG" sz="1600" dirty="0">
+                          <a:solidFill>
+                            <a:srgbClr val="0070C0"/>
+                          </a:solidFill>
+                        </a:rPr>
+                        <a:t>(Model is trained using development dataset from this file)</a:t>
+                      </a:r>
+                    </a:p>
+                  </a:txBody>
+                  <a:tcPr>
+                    <a:lnL w="12700" cap="flat" cmpd="sng" algn="ctr">
+                      <a:solidFill>
+                        <a:schemeClr val="tx1"/>
+                      </a:solidFill>
+                      <a:prstDash val="solid"/>
+                      <a:round/>
+                      <a:headEnd type="none" w="med" len="med"/>
+                      <a:tailEnd type="none" w="med" len="med"/>
+                    </a:lnL>
+                    <a:lnR w="12700" cap="flat" cmpd="sng" algn="ctr">
+                      <a:solidFill>
+                        <a:schemeClr val="tx1"/>
+                      </a:solidFill>
+                      <a:prstDash val="solid"/>
+                      <a:round/>
+                      <a:headEnd type="none" w="med" len="med"/>
+                      <a:tailEnd type="none" w="med" len="med"/>
+                    </a:lnR>
+                    <a:lnT w="12700" cap="flat" cmpd="sng" algn="ctr">
+                      <a:solidFill>
+                        <a:schemeClr val="tx1"/>
+                      </a:solidFill>
+                      <a:prstDash val="solid"/>
+                      <a:round/>
+                      <a:headEnd type="none" w="med" len="med"/>
+                      <a:tailEnd type="none" w="med" len="med"/>
+                    </a:lnT>
+                    <a:lnB w="12700" cap="flat" cmpd="sng" algn="ctr">
+                      <a:solidFill>
+                        <a:schemeClr val="tx1"/>
+                      </a:solidFill>
+                      <a:prstDash val="solid"/>
+                      <a:round/>
+                      <a:headEnd type="none" w="med" len="med"/>
+                      <a:tailEnd type="none" w="med" len="med"/>
+                    </a:lnB>
+                  </a:tcPr>
+                </a:tc>
+                <a:tc>
+                  <a:txBody>
+                    <a:bodyPr/>
+                    <a:lstStyle/>
+                    <a:p>
+                      <a:r>
+                        <a:rPr lang="en-SG" sz="1600" dirty="0"/>
+                        <a:t>3.3004</a:t>
+                      </a:r>
+                    </a:p>
+                  </a:txBody>
+                  <a:tcPr>
+                    <a:lnL w="12700" cap="flat" cmpd="sng" algn="ctr">
+                      <a:solidFill>
+                        <a:schemeClr val="tx1"/>
+                      </a:solidFill>
+                      <a:prstDash val="solid"/>
+                      <a:round/>
+                      <a:headEnd type="none" w="med" len="med"/>
+                      <a:tailEnd type="none" w="med" len="med"/>
+                    </a:lnL>
+                    <a:lnR w="12700" cap="flat" cmpd="sng" algn="ctr">
+                      <a:solidFill>
+                        <a:schemeClr val="tx1"/>
+                      </a:solidFill>
+                      <a:prstDash val="solid"/>
+                      <a:round/>
+                      <a:headEnd type="none" w="med" len="med"/>
+                      <a:tailEnd type="none" w="med" len="med"/>
+                    </a:lnR>
+                    <a:lnT w="12700" cap="flat" cmpd="sng" algn="ctr">
+                      <a:solidFill>
+                        <a:schemeClr val="tx1"/>
+                      </a:solidFill>
+                      <a:prstDash val="solid"/>
+                      <a:round/>
+                      <a:headEnd type="none" w="med" len="med"/>
+                      <a:tailEnd type="none" w="med" len="med"/>
+                    </a:lnT>
+                    <a:lnB w="12700" cap="flat" cmpd="sng" algn="ctr">
+                      <a:solidFill>
+                        <a:schemeClr val="tx1"/>
+                      </a:solidFill>
+                      <a:prstDash val="solid"/>
+                      <a:round/>
+                      <a:headEnd type="none" w="med" len="med"/>
+                      <a:tailEnd type="none" w="med" len="med"/>
+                    </a:lnB>
+                  </a:tcPr>
+                </a:tc>
+                <a:extLst>
+                  <a:ext uri="{0D108BD9-81ED-4DB2-BD59-A6C34878D82A}">
+                    <a16:rowId xmlns:a16="http://schemas.microsoft.com/office/drawing/2014/main" val="674220999"/>
+                  </a:ext>
+                </a:extLst>
+              </a:tr>
+              <a:tr h="410411">
+                <a:tc>
+                  <a:txBody>
+                    <a:bodyPr/>
+                    <a:lstStyle/>
+                    <a:p>
+                      <a:r>
+                        <a:rPr lang="en-SG" sz="1600" dirty="0"/>
+                        <a:t>N-CAMPSS_DS02-006.h5</a:t>
+                      </a:r>
+                    </a:p>
+                  </a:txBody>
+                  <a:tcPr>
+                    <a:lnL w="12700" cap="flat" cmpd="sng" algn="ctr">
+                      <a:solidFill>
+                        <a:schemeClr val="tx1"/>
+                      </a:solidFill>
+                      <a:prstDash val="solid"/>
+                      <a:round/>
+                      <a:headEnd type="none" w="med" len="med"/>
+                      <a:tailEnd type="none" w="med" len="med"/>
+                    </a:lnL>
+                    <a:lnR w="12700" cap="flat" cmpd="sng" algn="ctr">
+                      <a:solidFill>
+                        <a:schemeClr val="tx1"/>
+                      </a:solidFill>
+                      <a:prstDash val="solid"/>
+                      <a:round/>
+                      <a:headEnd type="none" w="med" len="med"/>
+                      <a:tailEnd type="none" w="med" len="med"/>
+                    </a:lnR>
+                    <a:lnT w="12700" cap="flat" cmpd="sng" algn="ctr">
+                      <a:solidFill>
+                        <a:schemeClr val="tx1"/>
+                      </a:solidFill>
+                      <a:prstDash val="solid"/>
+                      <a:round/>
+                      <a:headEnd type="none" w="med" len="med"/>
+                      <a:tailEnd type="none" w="med" len="med"/>
+                    </a:lnT>
+                    <a:lnB w="12700" cap="flat" cmpd="sng" algn="ctr">
+                      <a:solidFill>
+                        <a:schemeClr val="tx1"/>
+                      </a:solidFill>
+                      <a:prstDash val="solid"/>
+                      <a:round/>
+                      <a:headEnd type="none" w="med" len="med"/>
+                      <a:tailEnd type="none" w="med" len="med"/>
+                    </a:lnB>
+                  </a:tcPr>
+                </a:tc>
+                <a:tc>
+                  <a:txBody>
+                    <a:bodyPr/>
+                    <a:lstStyle/>
+                    <a:p>
+                      <a:r>
+                        <a:rPr lang="en-SG" sz="1600" dirty="0"/>
+                        <a:t>6.1840</a:t>
+                      </a:r>
+                    </a:p>
+                  </a:txBody>
+                  <a:tcPr>
+                    <a:lnL w="12700" cap="flat" cmpd="sng" algn="ctr">
+                      <a:solidFill>
+                        <a:schemeClr val="tx1"/>
+                      </a:solidFill>
+                      <a:prstDash val="solid"/>
+                      <a:round/>
+                      <a:headEnd type="none" w="med" len="med"/>
+                      <a:tailEnd type="none" w="med" len="med"/>
+                    </a:lnL>
+                    <a:lnR w="12700" cap="flat" cmpd="sng" algn="ctr">
+                      <a:solidFill>
+                        <a:schemeClr val="tx1"/>
+                      </a:solidFill>
+                      <a:prstDash val="solid"/>
+                      <a:round/>
+                      <a:headEnd type="none" w="med" len="med"/>
+                      <a:tailEnd type="none" w="med" len="med"/>
+                    </a:lnR>
+                    <a:lnT w="12700" cap="flat" cmpd="sng" algn="ctr">
+                      <a:solidFill>
+                        <a:schemeClr val="tx1"/>
+                      </a:solidFill>
+                      <a:prstDash val="solid"/>
+                      <a:round/>
+                      <a:headEnd type="none" w="med" len="med"/>
+                      <a:tailEnd type="none" w="med" len="med"/>
+                    </a:lnT>
+                    <a:lnB w="12700" cap="flat" cmpd="sng" algn="ctr">
+                      <a:solidFill>
+                        <a:schemeClr val="tx1"/>
+                      </a:solidFill>
+                      <a:prstDash val="solid"/>
+                      <a:round/>
+                      <a:headEnd type="none" w="med" len="med"/>
+                      <a:tailEnd type="none" w="med" len="med"/>
+                    </a:lnB>
+                  </a:tcPr>
+                </a:tc>
+                <a:extLst>
+                  <a:ext uri="{0D108BD9-81ED-4DB2-BD59-A6C34878D82A}">
+                    <a16:rowId xmlns:a16="http://schemas.microsoft.com/office/drawing/2014/main" val="3053710964"/>
+                  </a:ext>
+                </a:extLst>
+              </a:tr>
+              <a:tr h="422538">
+                <a:tc>
+                  <a:txBody>
+                    <a:bodyPr/>
+                    <a:lstStyle/>
+                    <a:p>
+                      <a:pPr marL="0" marR="0" lvl="0" indent="0" algn="l" defTabSz="914400" rtl="0" eaLnBrk="1" fontAlgn="auto" latinLnBrk="0" hangingPunct="1">
+                        <a:lnSpc>
+                          <a:spcPct val="100000"/>
+                        </a:lnSpc>
+                        <a:spcBef>
+                          <a:spcPts val="0"/>
+                        </a:spcBef>
+                        <a:spcAft>
+                          <a:spcPts val="0"/>
+                        </a:spcAft>
+                        <a:buClrTx/>
+                        <a:buSzTx/>
+                        <a:buFontTx/>
+                        <a:buNone/>
+                        <a:tabLst/>
+                        <a:defRPr/>
+                      </a:pPr>
+                      <a:r>
+                        <a:rPr lang="en-SG" sz="1600" dirty="0"/>
+                        <a:t>N-CAMPSS_DS03-012.h5</a:t>
+                      </a:r>
+                    </a:p>
+                  </a:txBody>
+                  <a:tcPr>
+                    <a:lnL w="12700" cap="flat" cmpd="sng" algn="ctr">
+                      <a:solidFill>
+                        <a:schemeClr val="tx1"/>
+                      </a:solidFill>
+                      <a:prstDash val="solid"/>
+                      <a:round/>
+                      <a:headEnd type="none" w="med" len="med"/>
+                      <a:tailEnd type="none" w="med" len="med"/>
+                    </a:lnL>
+                    <a:lnR w="12700" cap="flat" cmpd="sng" algn="ctr">
+                      <a:solidFill>
+                        <a:schemeClr val="tx1"/>
+                      </a:solidFill>
+                      <a:prstDash val="solid"/>
+                      <a:round/>
+                      <a:headEnd type="none" w="med" len="med"/>
+                      <a:tailEnd type="none" w="med" len="med"/>
+                    </a:lnR>
+                    <a:lnT w="12700" cap="flat" cmpd="sng" algn="ctr">
+                      <a:solidFill>
+                        <a:schemeClr val="tx1"/>
+                      </a:solidFill>
+                      <a:prstDash val="solid"/>
+                      <a:round/>
+                      <a:headEnd type="none" w="med" len="med"/>
+                      <a:tailEnd type="none" w="med" len="med"/>
+                    </a:lnT>
+                    <a:lnB w="12700" cap="flat" cmpd="sng" algn="ctr">
+                      <a:solidFill>
+                        <a:schemeClr val="tx1"/>
+                      </a:solidFill>
+                      <a:prstDash val="solid"/>
+                      <a:round/>
+                      <a:headEnd type="none" w="med" len="med"/>
+                      <a:tailEnd type="none" w="med" len="med"/>
+                    </a:lnB>
+                  </a:tcPr>
+                </a:tc>
+                <a:tc>
+                  <a:txBody>
+                    <a:bodyPr/>
+                    <a:lstStyle/>
+                    <a:p>
+                      <a:r>
+                        <a:rPr lang="en-SG" sz="1600" dirty="0"/>
+                        <a:t>5.6094</a:t>
+                      </a:r>
+                    </a:p>
+                  </a:txBody>
+                  <a:tcPr>
+                    <a:lnL w="12700" cap="flat" cmpd="sng" algn="ctr">
+                      <a:solidFill>
+                        <a:schemeClr val="tx1"/>
+                      </a:solidFill>
+                      <a:prstDash val="solid"/>
+                      <a:round/>
+                      <a:headEnd type="none" w="med" len="med"/>
+                      <a:tailEnd type="none" w="med" len="med"/>
+                    </a:lnL>
+                    <a:lnR w="12700" cap="flat" cmpd="sng" algn="ctr">
+                      <a:solidFill>
+                        <a:schemeClr val="tx1"/>
+                      </a:solidFill>
+                      <a:prstDash val="solid"/>
+                      <a:round/>
+                      <a:headEnd type="none" w="med" len="med"/>
+                      <a:tailEnd type="none" w="med" len="med"/>
+                    </a:lnR>
+                    <a:lnT w="12700" cap="flat" cmpd="sng" algn="ctr">
+                      <a:solidFill>
+                        <a:schemeClr val="tx1"/>
+                      </a:solidFill>
+                      <a:prstDash val="solid"/>
+                      <a:round/>
+                      <a:headEnd type="none" w="med" len="med"/>
+                      <a:tailEnd type="none" w="med" len="med"/>
+                    </a:lnT>
+                    <a:lnB w="12700" cap="flat" cmpd="sng" algn="ctr">
+                      <a:solidFill>
+                        <a:schemeClr val="tx1"/>
+                      </a:solidFill>
+                      <a:prstDash val="solid"/>
+                      <a:round/>
+                      <a:headEnd type="none" w="med" len="med"/>
+                      <a:tailEnd type="none" w="med" len="med"/>
+                    </a:lnB>
+                  </a:tcPr>
+                </a:tc>
+                <a:extLst>
+                  <a:ext uri="{0D108BD9-81ED-4DB2-BD59-A6C34878D82A}">
+                    <a16:rowId xmlns:a16="http://schemas.microsoft.com/office/drawing/2014/main" val="1063754087"/>
+                  </a:ext>
+                </a:extLst>
+              </a:tr>
+              <a:tr h="452517">
+                <a:tc>
+                  <a:txBody>
+                    <a:bodyPr/>
+                    <a:lstStyle/>
+                    <a:p>
+                      <a:pPr marL="0" marR="0" lvl="0" indent="0" algn="l" defTabSz="914400" rtl="0" eaLnBrk="1" fontAlgn="auto" latinLnBrk="0" hangingPunct="1">
+                        <a:lnSpc>
+                          <a:spcPct val="100000"/>
+                        </a:lnSpc>
+                        <a:spcBef>
+                          <a:spcPts val="0"/>
+                        </a:spcBef>
+                        <a:spcAft>
+                          <a:spcPts val="0"/>
+                        </a:spcAft>
+                        <a:buClrTx/>
+                        <a:buSzTx/>
+                        <a:buFontTx/>
+                        <a:buNone/>
+                        <a:tabLst/>
+                        <a:defRPr/>
+                      </a:pPr>
+                      <a:r>
+                        <a:rPr lang="en-SG" sz="1600" dirty="0"/>
+                        <a:t>N-CAMPSS_DS04.h5</a:t>
+                      </a:r>
+                    </a:p>
+                  </a:txBody>
+                  <a:tcPr>
+                    <a:lnL w="12700" cap="flat" cmpd="sng" algn="ctr">
+                      <a:solidFill>
+                        <a:schemeClr val="tx1"/>
+                      </a:solidFill>
+                      <a:prstDash val="solid"/>
+                      <a:round/>
+                      <a:headEnd type="none" w="med" len="med"/>
+                      <a:tailEnd type="none" w="med" len="med"/>
+                    </a:lnL>
+                    <a:lnR w="12700" cap="flat" cmpd="sng" algn="ctr">
+                      <a:solidFill>
+                        <a:schemeClr val="tx1"/>
+                      </a:solidFill>
+                      <a:prstDash val="solid"/>
+                      <a:round/>
+                      <a:headEnd type="none" w="med" len="med"/>
+                      <a:tailEnd type="none" w="med" len="med"/>
+                    </a:lnR>
+                    <a:lnT w="12700" cap="flat" cmpd="sng" algn="ctr">
+                      <a:solidFill>
+                        <a:schemeClr val="tx1"/>
+                      </a:solidFill>
+                      <a:prstDash val="solid"/>
+                      <a:round/>
+                      <a:headEnd type="none" w="med" len="med"/>
+                      <a:tailEnd type="none" w="med" len="med"/>
+                    </a:lnT>
+                    <a:lnB w="12700" cap="flat" cmpd="sng" algn="ctr">
+                      <a:solidFill>
+                        <a:schemeClr val="tx1"/>
+                      </a:solidFill>
+                      <a:prstDash val="solid"/>
+                      <a:round/>
+                      <a:headEnd type="none" w="med" len="med"/>
+                      <a:tailEnd type="none" w="med" len="med"/>
+                    </a:lnB>
+                  </a:tcPr>
+                </a:tc>
+                <a:tc>
+                  <a:txBody>
+                    <a:bodyPr/>
+                    <a:lstStyle/>
+                    <a:p>
+                      <a:r>
+                        <a:rPr lang="en-SG" sz="1600" dirty="0"/>
+                        <a:t>8.7607</a:t>
+                      </a:r>
+                    </a:p>
+                  </a:txBody>
+                  <a:tcPr>
+                    <a:lnL w="12700" cap="flat" cmpd="sng" algn="ctr">
+                      <a:solidFill>
+                        <a:schemeClr val="tx1"/>
+                      </a:solidFill>
+                      <a:prstDash val="solid"/>
+                      <a:round/>
+                      <a:headEnd type="none" w="med" len="med"/>
+                      <a:tailEnd type="none" w="med" len="med"/>
+                    </a:lnL>
+                    <a:lnR w="12700" cap="flat" cmpd="sng" algn="ctr">
+                      <a:solidFill>
+                        <a:schemeClr val="tx1"/>
+                      </a:solidFill>
+                      <a:prstDash val="solid"/>
+                      <a:round/>
+                      <a:headEnd type="none" w="med" len="med"/>
+                      <a:tailEnd type="none" w="med" len="med"/>
+                    </a:lnR>
+                    <a:lnT w="12700" cap="flat" cmpd="sng" algn="ctr">
+                      <a:solidFill>
+                        <a:schemeClr val="tx1"/>
+                      </a:solidFill>
+                      <a:prstDash val="solid"/>
+                      <a:round/>
+                      <a:headEnd type="none" w="med" len="med"/>
+                      <a:tailEnd type="none" w="med" len="med"/>
+                    </a:lnT>
+                    <a:lnB w="12700" cap="flat" cmpd="sng" algn="ctr">
+                      <a:solidFill>
+                        <a:schemeClr val="tx1"/>
+                      </a:solidFill>
+                      <a:prstDash val="solid"/>
+                      <a:round/>
+                      <a:headEnd type="none" w="med" len="med"/>
+                      <a:tailEnd type="none" w="med" len="med"/>
+                    </a:lnB>
+                  </a:tcPr>
+                </a:tc>
+                <a:extLst>
+                  <a:ext uri="{0D108BD9-81ED-4DB2-BD59-A6C34878D82A}">
+                    <a16:rowId xmlns:a16="http://schemas.microsoft.com/office/drawing/2014/main" val="736810651"/>
+                  </a:ext>
+                </a:extLst>
+              </a:tr>
+              <a:tr h="422538">
+                <a:tc>
+                  <a:txBody>
+                    <a:bodyPr/>
+                    <a:lstStyle/>
+                    <a:p>
+                      <a:pPr marL="0" marR="0" lvl="0" indent="0" algn="l" defTabSz="914400" rtl="0" eaLnBrk="1" fontAlgn="auto" latinLnBrk="0" hangingPunct="1">
+                        <a:lnSpc>
+                          <a:spcPct val="100000"/>
+                        </a:lnSpc>
+                        <a:spcBef>
+                          <a:spcPts val="0"/>
+                        </a:spcBef>
+                        <a:spcAft>
+                          <a:spcPts val="0"/>
+                        </a:spcAft>
+                        <a:buClrTx/>
+                        <a:buSzTx/>
+                        <a:buFontTx/>
+                        <a:buNone/>
+                        <a:tabLst/>
+                        <a:defRPr/>
+                      </a:pPr>
+                      <a:r>
+                        <a:rPr lang="en-SG" sz="1600" dirty="0"/>
+                        <a:t>N-CAMPSS_DS05.h5</a:t>
+                      </a:r>
+                    </a:p>
+                  </a:txBody>
+                  <a:tcPr>
+                    <a:lnL w="12700" cap="flat" cmpd="sng" algn="ctr">
+                      <a:solidFill>
+                        <a:schemeClr val="tx1"/>
+                      </a:solidFill>
+                      <a:prstDash val="solid"/>
+                      <a:round/>
+                      <a:headEnd type="none" w="med" len="med"/>
+                      <a:tailEnd type="none" w="med" len="med"/>
+                    </a:lnL>
+                    <a:lnR w="12700" cap="flat" cmpd="sng" algn="ctr">
+                      <a:solidFill>
+                        <a:schemeClr val="tx1"/>
+                      </a:solidFill>
+                      <a:prstDash val="solid"/>
+                      <a:round/>
+                      <a:headEnd type="none" w="med" len="med"/>
+                      <a:tailEnd type="none" w="med" len="med"/>
+                    </a:lnR>
+                    <a:lnT w="12700" cap="flat" cmpd="sng" algn="ctr">
+                      <a:solidFill>
+                        <a:schemeClr val="tx1"/>
+                      </a:solidFill>
+                      <a:prstDash val="solid"/>
+                      <a:round/>
+                      <a:headEnd type="none" w="med" len="med"/>
+                      <a:tailEnd type="none" w="med" len="med"/>
+                    </a:lnT>
+                    <a:lnB w="12700" cap="flat" cmpd="sng" algn="ctr">
+                      <a:solidFill>
+                        <a:schemeClr val="tx1"/>
+                      </a:solidFill>
+                      <a:prstDash val="solid"/>
+                      <a:round/>
+                      <a:headEnd type="none" w="med" len="med"/>
+                      <a:tailEnd type="none" w="med" len="med"/>
+                    </a:lnB>
+                  </a:tcPr>
+                </a:tc>
+                <a:tc>
+                  <a:txBody>
+                    <a:bodyPr/>
+                    <a:lstStyle/>
+                    <a:p>
+                      <a:r>
+                        <a:rPr lang="en-SG" sz="1600" dirty="0"/>
+                        <a:t>8.9196</a:t>
+                      </a:r>
+                    </a:p>
+                  </a:txBody>
+                  <a:tcPr>
+                    <a:lnL w="12700" cap="flat" cmpd="sng" algn="ctr">
+                      <a:solidFill>
+                        <a:schemeClr val="tx1"/>
+                      </a:solidFill>
+                      <a:prstDash val="solid"/>
+                      <a:round/>
+                      <a:headEnd type="none" w="med" len="med"/>
+                      <a:tailEnd type="none" w="med" len="med"/>
+                    </a:lnL>
+                    <a:lnR w="12700" cap="flat" cmpd="sng" algn="ctr">
+                      <a:solidFill>
+                        <a:schemeClr val="tx1"/>
+                      </a:solidFill>
+                      <a:prstDash val="solid"/>
+                      <a:round/>
+                      <a:headEnd type="none" w="med" len="med"/>
+                      <a:tailEnd type="none" w="med" len="med"/>
+                    </a:lnR>
+                    <a:lnT w="12700" cap="flat" cmpd="sng" algn="ctr">
+                      <a:solidFill>
+                        <a:schemeClr val="tx1"/>
+                      </a:solidFill>
+                      <a:prstDash val="solid"/>
+                      <a:round/>
+                      <a:headEnd type="none" w="med" len="med"/>
+                      <a:tailEnd type="none" w="med" len="med"/>
+                    </a:lnT>
+                    <a:lnB w="12700" cap="flat" cmpd="sng" algn="ctr">
+                      <a:solidFill>
+                        <a:schemeClr val="tx1"/>
+                      </a:solidFill>
+                      <a:prstDash val="solid"/>
+                      <a:round/>
+                      <a:headEnd type="none" w="med" len="med"/>
+                      <a:tailEnd type="none" w="med" len="med"/>
+                    </a:lnB>
+                  </a:tcPr>
+                </a:tc>
+                <a:extLst>
+                  <a:ext uri="{0D108BD9-81ED-4DB2-BD59-A6C34878D82A}">
+                    <a16:rowId xmlns:a16="http://schemas.microsoft.com/office/drawing/2014/main" val="3286356312"/>
+                  </a:ext>
+                </a:extLst>
+              </a:tr>
+              <a:tr h="422538">
+                <a:tc>
+                  <a:txBody>
+                    <a:bodyPr/>
+                    <a:lstStyle/>
+                    <a:p>
+                      <a:pPr marL="0" marR="0" lvl="0" indent="0" algn="l" defTabSz="914400" rtl="0" eaLnBrk="1" fontAlgn="auto" latinLnBrk="0" hangingPunct="1">
+                        <a:lnSpc>
+                          <a:spcPct val="100000"/>
+                        </a:lnSpc>
+                        <a:spcBef>
+                          <a:spcPts val="0"/>
+                        </a:spcBef>
+                        <a:spcAft>
+                          <a:spcPts val="0"/>
+                        </a:spcAft>
+                        <a:buClrTx/>
+                        <a:buSzTx/>
+                        <a:buFontTx/>
+                        <a:buNone/>
+                        <a:tabLst/>
+                        <a:defRPr/>
+                      </a:pPr>
+                      <a:r>
+                        <a:rPr lang="en-SG" sz="1600" dirty="0"/>
+                        <a:t>N-CAMPSS_DS06.h5</a:t>
+                      </a:r>
+                    </a:p>
+                  </a:txBody>
+                  <a:tcPr>
+                    <a:lnL w="12700" cap="flat" cmpd="sng" algn="ctr">
+                      <a:solidFill>
+                        <a:schemeClr val="tx1"/>
+                      </a:solidFill>
+                      <a:prstDash val="solid"/>
+                      <a:round/>
+                      <a:headEnd type="none" w="med" len="med"/>
+                      <a:tailEnd type="none" w="med" len="med"/>
+                    </a:lnL>
+                    <a:lnR w="12700" cap="flat" cmpd="sng" algn="ctr">
+                      <a:solidFill>
+                        <a:schemeClr val="tx1"/>
+                      </a:solidFill>
+                      <a:prstDash val="solid"/>
+                      <a:round/>
+                      <a:headEnd type="none" w="med" len="med"/>
+                      <a:tailEnd type="none" w="med" len="med"/>
+                    </a:lnR>
+                    <a:lnT w="12700" cap="flat" cmpd="sng" algn="ctr">
+                      <a:solidFill>
+                        <a:schemeClr val="tx1"/>
+                      </a:solidFill>
+                      <a:prstDash val="solid"/>
+                      <a:round/>
+                      <a:headEnd type="none" w="med" len="med"/>
+                      <a:tailEnd type="none" w="med" len="med"/>
+                    </a:lnT>
+                    <a:lnB w="12700" cap="flat" cmpd="sng" algn="ctr">
+                      <a:solidFill>
+                        <a:schemeClr val="tx1"/>
+                      </a:solidFill>
+                      <a:prstDash val="solid"/>
+                      <a:round/>
+                      <a:headEnd type="none" w="med" len="med"/>
+                      <a:tailEnd type="none" w="med" len="med"/>
+                    </a:lnB>
+                  </a:tcPr>
+                </a:tc>
+                <a:tc>
+                  <a:txBody>
+                    <a:bodyPr/>
+                    <a:lstStyle/>
+                    <a:p>
+                      <a:r>
+                        <a:rPr lang="en-SG" sz="1600" dirty="0"/>
+                        <a:t>10.9219</a:t>
+                      </a:r>
+                    </a:p>
+                  </a:txBody>
+                  <a:tcPr>
+                    <a:lnL w="12700" cap="flat" cmpd="sng" algn="ctr">
+                      <a:solidFill>
+                        <a:schemeClr val="tx1"/>
+                      </a:solidFill>
+                      <a:prstDash val="solid"/>
+                      <a:round/>
+                      <a:headEnd type="none" w="med" len="med"/>
+                      <a:tailEnd type="none" w="med" len="med"/>
+                    </a:lnL>
+                    <a:lnR w="12700" cap="flat" cmpd="sng" algn="ctr">
+                      <a:solidFill>
+                        <a:schemeClr val="tx1"/>
+                      </a:solidFill>
+                      <a:prstDash val="solid"/>
+                      <a:round/>
+                      <a:headEnd type="none" w="med" len="med"/>
+                      <a:tailEnd type="none" w="med" len="med"/>
+                    </a:lnR>
+                    <a:lnT w="12700" cap="flat" cmpd="sng" algn="ctr">
+                      <a:solidFill>
+                        <a:schemeClr val="tx1"/>
+                      </a:solidFill>
+                      <a:prstDash val="solid"/>
+                      <a:round/>
+                      <a:headEnd type="none" w="med" len="med"/>
+                      <a:tailEnd type="none" w="med" len="med"/>
+                    </a:lnT>
+                    <a:lnB w="12700" cap="flat" cmpd="sng" algn="ctr">
+                      <a:solidFill>
+                        <a:schemeClr val="tx1"/>
+                      </a:solidFill>
+                      <a:prstDash val="solid"/>
+                      <a:round/>
+                      <a:headEnd type="none" w="med" len="med"/>
+                      <a:tailEnd type="none" w="med" len="med"/>
+                    </a:lnB>
+                  </a:tcPr>
+                </a:tc>
+                <a:extLst>
+                  <a:ext uri="{0D108BD9-81ED-4DB2-BD59-A6C34878D82A}">
+                    <a16:rowId xmlns:a16="http://schemas.microsoft.com/office/drawing/2014/main" val="3355265882"/>
+                  </a:ext>
+                </a:extLst>
+              </a:tr>
+              <a:tr h="422538">
+                <a:tc>
+                  <a:txBody>
+                    <a:bodyPr/>
+                    <a:lstStyle/>
+                    <a:p>
+                      <a:pPr marL="0" marR="0" lvl="0" indent="0" algn="l" defTabSz="914400" rtl="0" eaLnBrk="1" fontAlgn="auto" latinLnBrk="0" hangingPunct="1">
+                        <a:lnSpc>
+                          <a:spcPct val="100000"/>
+                        </a:lnSpc>
+                        <a:spcBef>
+                          <a:spcPts val="0"/>
+                        </a:spcBef>
+                        <a:spcAft>
+                          <a:spcPts val="0"/>
+                        </a:spcAft>
+                        <a:buClrTx/>
+                        <a:buSzTx/>
+                        <a:buFontTx/>
+                        <a:buNone/>
+                        <a:tabLst/>
+                        <a:defRPr/>
+                      </a:pPr>
+                      <a:r>
+                        <a:rPr lang="en-SG" sz="1600" dirty="0"/>
+                        <a:t>N-CAMPSS_DS07.h5</a:t>
+                      </a:r>
+                    </a:p>
+                  </a:txBody>
+                  <a:tcPr>
+                    <a:lnL w="12700" cap="flat" cmpd="sng" algn="ctr">
+                      <a:solidFill>
+                        <a:schemeClr val="tx1"/>
+                      </a:solidFill>
+                      <a:prstDash val="solid"/>
+                      <a:round/>
+                      <a:headEnd type="none" w="med" len="med"/>
+                      <a:tailEnd type="none" w="med" len="med"/>
+                    </a:lnL>
+                    <a:lnR w="12700" cap="flat" cmpd="sng" algn="ctr">
+                      <a:solidFill>
+                        <a:schemeClr val="tx1"/>
+                      </a:solidFill>
+                      <a:prstDash val="solid"/>
+                      <a:round/>
+                      <a:headEnd type="none" w="med" len="med"/>
+                      <a:tailEnd type="none" w="med" len="med"/>
+                    </a:lnR>
+                    <a:lnT w="12700" cap="flat" cmpd="sng" algn="ctr">
+                      <a:solidFill>
+                        <a:schemeClr val="tx1"/>
+                      </a:solidFill>
+                      <a:prstDash val="solid"/>
+                      <a:round/>
+                      <a:headEnd type="none" w="med" len="med"/>
+                      <a:tailEnd type="none" w="med" len="med"/>
+                    </a:lnT>
+                    <a:lnB w="12700" cap="flat" cmpd="sng" algn="ctr">
+                      <a:solidFill>
+                        <a:schemeClr val="tx1"/>
+                      </a:solidFill>
+                      <a:prstDash val="solid"/>
+                      <a:round/>
+                      <a:headEnd type="none" w="med" len="med"/>
+                      <a:tailEnd type="none" w="med" len="med"/>
+                    </a:lnB>
+                  </a:tcPr>
+                </a:tc>
+                <a:tc>
+                  <a:txBody>
+                    <a:bodyPr/>
+                    <a:lstStyle/>
+                    <a:p>
+                      <a:r>
+                        <a:rPr lang="en-SG" sz="1600" dirty="0"/>
+                        <a:t>8.2998</a:t>
+                      </a:r>
+                    </a:p>
+                  </a:txBody>
+                  <a:tcPr>
+                    <a:lnL w="12700" cap="flat" cmpd="sng" algn="ctr">
+                      <a:solidFill>
+                        <a:schemeClr val="tx1"/>
+                      </a:solidFill>
+                      <a:prstDash val="solid"/>
+                      <a:round/>
+                      <a:headEnd type="none" w="med" len="med"/>
+                      <a:tailEnd type="none" w="med" len="med"/>
+                    </a:lnL>
+                    <a:lnR w="12700" cap="flat" cmpd="sng" algn="ctr">
+                      <a:solidFill>
+                        <a:schemeClr val="tx1"/>
+                      </a:solidFill>
+                      <a:prstDash val="solid"/>
+                      <a:round/>
+                      <a:headEnd type="none" w="med" len="med"/>
+                      <a:tailEnd type="none" w="med" len="med"/>
+                    </a:lnR>
+                    <a:lnT w="12700" cap="flat" cmpd="sng" algn="ctr">
+                      <a:solidFill>
+                        <a:schemeClr val="tx1"/>
+                      </a:solidFill>
+                      <a:prstDash val="solid"/>
+                      <a:round/>
+                      <a:headEnd type="none" w="med" len="med"/>
+                      <a:tailEnd type="none" w="med" len="med"/>
+                    </a:lnT>
+                    <a:lnB w="12700" cap="flat" cmpd="sng" algn="ctr">
+                      <a:solidFill>
+                        <a:schemeClr val="tx1"/>
+                      </a:solidFill>
+                      <a:prstDash val="solid"/>
+                      <a:round/>
+                      <a:headEnd type="none" w="med" len="med"/>
+                      <a:tailEnd type="none" w="med" len="med"/>
+                    </a:lnB>
+                  </a:tcPr>
+                </a:tc>
+                <a:extLst>
+                  <a:ext uri="{0D108BD9-81ED-4DB2-BD59-A6C34878D82A}">
+                    <a16:rowId xmlns:a16="http://schemas.microsoft.com/office/drawing/2014/main" val="526206621"/>
+                  </a:ext>
+                </a:extLst>
+              </a:tr>
+            </a:tbl>
+          </a:graphicData>
+        </a:graphic>
+      </p:graphicFrame>
+      <p:sp>
+        <p:nvSpPr>
+          <p:cNvPr id="16" name="TextBox 15">
+            <a:extLst>
+              <a:ext uri="{FF2B5EF4-FFF2-40B4-BE49-F238E27FC236}">
+                <a16:creationId xmlns:a16="http://schemas.microsoft.com/office/drawing/2014/main" id="{88334D0F-F44E-4D74-9975-70A6DF4CDB3C}"/>
+              </a:ext>
+            </a:extLst>
+          </p:cNvPr>
+          <p:cNvSpPr txBox="1"/>
+          <p:nvPr/>
+        </p:nvSpPr>
+        <p:spPr>
+          <a:xfrm>
+            <a:off x="2770218" y="612104"/>
+            <a:ext cx="6097384" cy="338554"/>
+          </a:xfrm>
+          <a:prstGeom prst="rect">
+            <a:avLst/>
+          </a:prstGeom>
+          <a:noFill/>
+        </p:spPr>
+        <p:txBody>
+          <a:bodyPr wrap="square">
+            <a:spAutoFit/>
+          </a:bodyPr>
+          <a:lstStyle/>
+          <a:p>
+            <a:pPr marL="0" marR="0" lvl="0" indent="0" algn="ctr" defTabSz="914400" rtl="0" eaLnBrk="1" fontAlgn="auto" latinLnBrk="0" hangingPunct="1">
+              <a:lnSpc>
+                <a:spcPct val="100000"/>
+              </a:lnSpc>
+              <a:spcBef>
+                <a:spcPts val="0"/>
+              </a:spcBef>
+              <a:spcAft>
+                <a:spcPts val="0"/>
+              </a:spcAft>
+              <a:buClrTx/>
+              <a:buSzTx/>
+              <a:buFontTx/>
+              <a:buNone/>
+              <a:tabLst/>
+              <a:defRPr/>
+            </a:pPr>
+            <a:r>
+              <a:rPr lang="en-SG" sz="1600" b="1" dirty="0"/>
+              <a:t>Ridge regression (with lag features) on test dataset</a:t>
+            </a:r>
+          </a:p>
+        </p:txBody>
+      </p:sp>
+      <p:sp>
+        <p:nvSpPr>
+          <p:cNvPr id="20" name="TextBox 19">
+            <a:extLst>
+              <a:ext uri="{FF2B5EF4-FFF2-40B4-BE49-F238E27FC236}">
+                <a16:creationId xmlns:a16="http://schemas.microsoft.com/office/drawing/2014/main" id="{FAE34EC0-604C-4BC1-8B93-0555EE7E6445}"/>
+              </a:ext>
+            </a:extLst>
+          </p:cNvPr>
+          <p:cNvSpPr txBox="1"/>
+          <p:nvPr/>
+        </p:nvSpPr>
+        <p:spPr>
+          <a:xfrm>
+            <a:off x="443218" y="4756692"/>
+            <a:ext cx="11667514" cy="1077218"/>
+          </a:xfrm>
+          <a:prstGeom prst="rect">
+            <a:avLst/>
+          </a:prstGeom>
+          <a:noFill/>
+        </p:spPr>
+        <p:txBody>
+          <a:bodyPr wrap="square">
+            <a:spAutoFit/>
+          </a:bodyPr>
+          <a:lstStyle/>
+          <a:p>
+            <a:pPr marL="285750" indent="-285750">
+              <a:buFont typeface="Arial" panose="020B0604020202020204" pitchFamily="34" charset="0"/>
+              <a:buChar char="•"/>
+            </a:pPr>
+            <a:r>
+              <a:rPr lang="en-SG" sz="1600" dirty="0"/>
+              <a:t>Ridge regression trained with lag features is used to infer test dataset from the remaining data files</a:t>
+            </a:r>
+          </a:p>
+          <a:p>
+            <a:pPr marL="285750" indent="-285750">
+              <a:buFont typeface="Arial" panose="020B0604020202020204" pitchFamily="34" charset="0"/>
+              <a:buChar char="•"/>
+            </a:pPr>
+            <a:r>
+              <a:rPr lang="en-SG" sz="1600" dirty="0"/>
+              <a:t>RMSE results are tabulated as shown in the table above and the diagrams are shown in slide 15-17</a:t>
+            </a:r>
+          </a:p>
+          <a:p>
+            <a:pPr marL="285750" indent="-285750">
+              <a:buFont typeface="Arial" panose="020B0604020202020204" pitchFamily="34" charset="0"/>
+              <a:buChar char="•"/>
+            </a:pPr>
+            <a:r>
+              <a:rPr lang="en-SG" sz="1600" dirty="0"/>
+              <a:t>Results seem to suggest that the model trained using a dataset (N-CAMPSS_DS01-005.h5) is able to generalize well on other test data involving different units and failure modes</a:t>
+            </a:r>
+          </a:p>
+        </p:txBody>
+      </p:sp>
+    </p:spTree>
+    <p:extLst>
+      <p:ext uri="{BB962C8B-B14F-4D97-AF65-F5344CB8AC3E}">
+        <p14:creationId xmlns:p14="http://schemas.microsoft.com/office/powerpoint/2010/main" val="4287149885"/>
+      </p:ext>
+    </p:extLst>
+  </p:cSld>
+  <p:clrMapOvr>
+    <a:masterClrMapping/>
+  </p:clrMapOvr>
+</p:sld>
+</file>
+
+<file path=ppt/slides/slide15.xml><?xml version="1.0" encoding="utf-8"?>
+<p:sld xmlns:a="http://schemas.openxmlformats.org/drawingml/2006/main" xmlns:r="http://schemas.openxmlformats.org/officeDocument/2006/relationships" xmlns:p="http://schemas.openxmlformats.org/presentationml/2006/main">
+  <p:cSld>
+    <p:spTree>
+      <p:nvGrpSpPr>
+        <p:cNvPr id="1" name=""/>
+        <p:cNvGrpSpPr/>
+        <p:nvPr/>
+      </p:nvGrpSpPr>
+      <p:grpSpPr>
+        <a:xfrm>
+          <a:off x="0" y="0"/>
+          <a:ext cx="0" cy="0"/>
+          <a:chOff x="0" y="0"/>
+          <a:chExt cx="0" cy="0"/>
+        </a:xfrm>
+      </p:grpSpPr>
+      <p:sp>
+        <p:nvSpPr>
+          <p:cNvPr id="5" name="TextBox 4">
+            <a:extLst>
+              <a:ext uri="{FF2B5EF4-FFF2-40B4-BE49-F238E27FC236}">
+                <a16:creationId xmlns:a16="http://schemas.microsoft.com/office/drawing/2014/main" id="{13BEAA79-A8D6-45DE-B737-2BB38ECE669C}"/>
+              </a:ext>
+            </a:extLst>
+          </p:cNvPr>
+          <p:cNvSpPr txBox="1"/>
+          <p:nvPr/>
+        </p:nvSpPr>
+        <p:spPr>
+          <a:xfrm>
+            <a:off x="202242" y="89566"/>
+            <a:ext cx="4504545" cy="461665"/>
+          </a:xfrm>
+          <a:prstGeom prst="rect">
+            <a:avLst/>
+          </a:prstGeom>
+          <a:noFill/>
+        </p:spPr>
+        <p:txBody>
+          <a:bodyPr wrap="square" rtlCol="0">
+            <a:spAutoFit/>
+          </a:bodyPr>
+          <a:lstStyle/>
+          <a:p>
+            <a:r>
+              <a:rPr lang="en-US" sz="2400" b="1" dirty="0"/>
+              <a:t>Results</a:t>
+            </a:r>
+            <a:endParaRPr lang="en-SG" sz="2400" b="1" dirty="0"/>
+          </a:p>
+        </p:txBody>
+      </p:sp>
+      <p:cxnSp>
+        <p:nvCxnSpPr>
+          <p:cNvPr id="9" name="Straight Connector 8">
+            <a:extLst>
+              <a:ext uri="{FF2B5EF4-FFF2-40B4-BE49-F238E27FC236}">
+                <a16:creationId xmlns:a16="http://schemas.microsoft.com/office/drawing/2014/main" id="{F0F31EF4-F02A-44E0-8175-1D943745BBE4}"/>
+              </a:ext>
+            </a:extLst>
+          </p:cNvPr>
+          <p:cNvCxnSpPr/>
+          <p:nvPr/>
+        </p:nvCxnSpPr>
+        <p:spPr>
+          <a:xfrm>
+            <a:off x="6125337" y="886573"/>
+            <a:ext cx="0" cy="5684096"/>
+          </a:xfrm>
+          <a:prstGeom prst="line">
+            <a:avLst/>
+          </a:prstGeom>
+          <a:ln w="19050">
+            <a:solidFill>
+              <a:schemeClr val="tx1"/>
+            </a:solidFill>
+            <a:prstDash val="lgDashDot"/>
+          </a:ln>
+        </p:spPr>
+        <p:style>
+          <a:lnRef idx="1">
+            <a:schemeClr val="accent1"/>
+          </a:lnRef>
+          <a:fillRef idx="0">
+            <a:schemeClr val="accent1"/>
+          </a:fillRef>
+          <a:effectRef idx="0">
+            <a:schemeClr val="accent1"/>
+          </a:effectRef>
+          <a:fontRef idx="minor">
+            <a:schemeClr val="tx1"/>
+          </a:fontRef>
+        </p:style>
+      </p:cxnSp>
+      <p:cxnSp>
+        <p:nvCxnSpPr>
+          <p:cNvPr id="11" name="Straight Connector 10">
+            <a:extLst>
+              <a:ext uri="{FF2B5EF4-FFF2-40B4-BE49-F238E27FC236}">
+                <a16:creationId xmlns:a16="http://schemas.microsoft.com/office/drawing/2014/main" id="{71B88A5D-4593-4C4D-964A-ACA6B75E3A7D}"/>
+              </a:ext>
+            </a:extLst>
+          </p:cNvPr>
+          <p:cNvCxnSpPr>
+            <a:cxnSpLocks/>
+          </p:cNvCxnSpPr>
+          <p:nvPr/>
+        </p:nvCxnSpPr>
+        <p:spPr>
+          <a:xfrm flipH="1" flipV="1">
+            <a:off x="266698" y="886573"/>
+            <a:ext cx="11372850" cy="4762"/>
+          </a:xfrm>
+          <a:prstGeom prst="line">
+            <a:avLst/>
+          </a:prstGeom>
+          <a:ln w="19050">
+            <a:solidFill>
+              <a:schemeClr val="tx1"/>
+            </a:solidFill>
+            <a:prstDash val="lgDashDot"/>
+          </a:ln>
+        </p:spPr>
+        <p:style>
+          <a:lnRef idx="1">
+            <a:schemeClr val="accent1"/>
+          </a:lnRef>
+          <a:fillRef idx="0">
+            <a:schemeClr val="accent1"/>
+          </a:fillRef>
+          <a:effectRef idx="0">
+            <a:schemeClr val="accent1"/>
+          </a:effectRef>
+          <a:fontRef idx="minor">
+            <a:schemeClr val="tx1"/>
+          </a:fontRef>
+        </p:style>
+      </p:cxnSp>
+      <p:sp>
+        <p:nvSpPr>
+          <p:cNvPr id="14" name="TextBox 13">
+            <a:extLst>
+              <a:ext uri="{FF2B5EF4-FFF2-40B4-BE49-F238E27FC236}">
+                <a16:creationId xmlns:a16="http://schemas.microsoft.com/office/drawing/2014/main" id="{FB315EF9-E5E8-4EBB-8AB0-19C14560B397}"/>
+              </a:ext>
+            </a:extLst>
+          </p:cNvPr>
+          <p:cNvSpPr txBox="1"/>
+          <p:nvPr/>
+        </p:nvSpPr>
+        <p:spPr>
+          <a:xfrm>
+            <a:off x="1792135" y="982210"/>
+            <a:ext cx="2792731" cy="338554"/>
+          </a:xfrm>
+          <a:prstGeom prst="rect">
+            <a:avLst/>
+          </a:prstGeom>
+          <a:noFill/>
+        </p:spPr>
+        <p:txBody>
+          <a:bodyPr wrap="square" rtlCol="0">
+            <a:spAutoFit/>
+          </a:bodyPr>
+          <a:lstStyle/>
+          <a:p>
+            <a:pPr algn="ctr"/>
+            <a:r>
+              <a:rPr lang="en-US" sz="1600" b="1" dirty="0"/>
+              <a:t>N-CAMPSS_DS02-006.h5</a:t>
+            </a:r>
+          </a:p>
+        </p:txBody>
+      </p:sp>
+      <p:sp>
+        <p:nvSpPr>
+          <p:cNvPr id="15" name="TextBox 14">
+            <a:extLst>
+              <a:ext uri="{FF2B5EF4-FFF2-40B4-BE49-F238E27FC236}">
+                <a16:creationId xmlns:a16="http://schemas.microsoft.com/office/drawing/2014/main" id="{6CE3865A-6C5A-424F-B922-CF53D91F1913}"/>
+              </a:ext>
+            </a:extLst>
+          </p:cNvPr>
+          <p:cNvSpPr txBox="1"/>
+          <p:nvPr/>
+        </p:nvSpPr>
+        <p:spPr>
+          <a:xfrm>
+            <a:off x="7607134" y="982210"/>
+            <a:ext cx="2792731" cy="338554"/>
+          </a:xfrm>
+          <a:prstGeom prst="rect">
+            <a:avLst/>
+          </a:prstGeom>
+          <a:noFill/>
+        </p:spPr>
+        <p:txBody>
+          <a:bodyPr wrap="square" rtlCol="0">
+            <a:spAutoFit/>
+          </a:bodyPr>
+          <a:lstStyle/>
+          <a:p>
+            <a:pPr algn="ctr"/>
+            <a:r>
+              <a:rPr lang="en-US" sz="1600" b="1" dirty="0"/>
+              <a:t>N-CAMPSS_DS03-012.h5</a:t>
+            </a:r>
+          </a:p>
+        </p:txBody>
+      </p:sp>
+      <p:sp>
+        <p:nvSpPr>
+          <p:cNvPr id="17" name="TextBox 16">
+            <a:extLst>
+              <a:ext uri="{FF2B5EF4-FFF2-40B4-BE49-F238E27FC236}">
+                <a16:creationId xmlns:a16="http://schemas.microsoft.com/office/drawing/2014/main" id="{D2B8853A-4C8A-4C77-B070-867040F95000}"/>
+              </a:ext>
+            </a:extLst>
+          </p:cNvPr>
+          <p:cNvSpPr txBox="1"/>
+          <p:nvPr/>
+        </p:nvSpPr>
+        <p:spPr>
+          <a:xfrm>
+            <a:off x="1459213" y="6111899"/>
+            <a:ext cx="3458573" cy="338554"/>
+          </a:xfrm>
+          <a:prstGeom prst="rect">
+            <a:avLst/>
+          </a:prstGeom>
+          <a:noFill/>
+        </p:spPr>
+        <p:txBody>
+          <a:bodyPr wrap="square">
+            <a:spAutoFit/>
+          </a:bodyPr>
+          <a:lstStyle/>
+          <a:p>
+            <a:pPr algn="ctr"/>
+            <a:r>
+              <a:rPr lang="en-SG" sz="1600" dirty="0"/>
+              <a:t>RMSE: 6.1840</a:t>
+            </a:r>
+          </a:p>
+        </p:txBody>
+      </p:sp>
+      <p:sp>
+        <p:nvSpPr>
+          <p:cNvPr id="18" name="TextBox 17">
+            <a:extLst>
+              <a:ext uri="{FF2B5EF4-FFF2-40B4-BE49-F238E27FC236}">
+                <a16:creationId xmlns:a16="http://schemas.microsoft.com/office/drawing/2014/main" id="{48C9C2D3-343F-467C-925B-29AB62D7FBF2}"/>
+              </a:ext>
+            </a:extLst>
+          </p:cNvPr>
+          <p:cNvSpPr txBox="1"/>
+          <p:nvPr/>
+        </p:nvSpPr>
+        <p:spPr>
+          <a:xfrm>
+            <a:off x="7332889" y="6111899"/>
+            <a:ext cx="3458573" cy="338554"/>
+          </a:xfrm>
+          <a:prstGeom prst="rect">
+            <a:avLst/>
+          </a:prstGeom>
+          <a:noFill/>
+        </p:spPr>
+        <p:txBody>
+          <a:bodyPr wrap="square">
+            <a:spAutoFit/>
+          </a:bodyPr>
+          <a:lstStyle/>
+          <a:p>
+            <a:pPr algn="ctr"/>
+            <a:r>
+              <a:rPr lang="en-SG" sz="1600" dirty="0"/>
+              <a:t>RMSE: 5.6094 </a:t>
+            </a:r>
+          </a:p>
+        </p:txBody>
+      </p:sp>
+      <p:sp>
+        <p:nvSpPr>
+          <p:cNvPr id="12" name="TextBox 11">
+            <a:extLst>
+              <a:ext uri="{FF2B5EF4-FFF2-40B4-BE49-F238E27FC236}">
+                <a16:creationId xmlns:a16="http://schemas.microsoft.com/office/drawing/2014/main" id="{9A40E4A1-1751-441A-A60A-3CCD4D3DAADB}"/>
+              </a:ext>
+            </a:extLst>
+          </p:cNvPr>
+          <p:cNvSpPr txBox="1"/>
+          <p:nvPr/>
+        </p:nvSpPr>
+        <p:spPr>
+          <a:xfrm>
+            <a:off x="-227457" y="502582"/>
+            <a:ext cx="11257788" cy="338554"/>
+          </a:xfrm>
+          <a:prstGeom prst="rect">
+            <a:avLst/>
+          </a:prstGeom>
+          <a:noFill/>
+        </p:spPr>
+        <p:txBody>
+          <a:bodyPr wrap="square">
+            <a:spAutoFit/>
+          </a:bodyPr>
+          <a:lstStyle/>
+          <a:p>
+            <a:pPr marL="0" marR="0" lvl="0" indent="0" algn="ctr" defTabSz="914400" rtl="0" eaLnBrk="1" fontAlgn="auto" latinLnBrk="0" hangingPunct="1">
+              <a:lnSpc>
+                <a:spcPct val="100000"/>
+              </a:lnSpc>
+              <a:spcBef>
+                <a:spcPts val="0"/>
+              </a:spcBef>
+              <a:spcAft>
+                <a:spcPts val="0"/>
+              </a:spcAft>
+              <a:buClrTx/>
+              <a:buSzTx/>
+              <a:buFontTx/>
+              <a:buNone/>
+              <a:tabLst/>
+              <a:defRPr/>
+            </a:pPr>
+            <a:r>
+              <a:rPr lang="en-SG" sz="1600" b="1" dirty="0"/>
+              <a:t>Ridge regression model (with lag features) trained on N-CAMPSS_DS01-005.h5 performing inference on test dataset from: </a:t>
+            </a:r>
+          </a:p>
+        </p:txBody>
+      </p:sp>
+      <p:pic>
+        <p:nvPicPr>
+          <p:cNvPr id="3" name="Picture 2" descr="Chart, line chart&#10;&#10;Description automatically generated">
+            <a:extLst>
+              <a:ext uri="{FF2B5EF4-FFF2-40B4-BE49-F238E27FC236}">
+                <a16:creationId xmlns:a16="http://schemas.microsoft.com/office/drawing/2014/main" id="{27C46D07-F0C0-4FA7-BC53-DC93FE7E0B22}"/>
+              </a:ext>
+            </a:extLst>
+          </p:cNvPr>
+          <p:cNvPicPr>
+            <a:picLocks noChangeAspect="1"/>
+          </p:cNvPicPr>
+          <p:nvPr/>
+        </p:nvPicPr>
+        <p:blipFill rotWithShape="1">
+          <a:blip r:embed="rId2">
+            <a:extLst>
+              <a:ext uri="{28A0092B-C50C-407E-A947-70E740481C1C}">
+                <a14:useLocalDpi xmlns:a14="http://schemas.microsoft.com/office/drawing/2010/main" val="0"/>
+              </a:ext>
+            </a:extLst>
+          </a:blip>
+          <a:srcRect l="10312" t="9514" r="8854" b="7328"/>
+          <a:stretch/>
+        </p:blipFill>
+        <p:spPr>
+          <a:xfrm>
+            <a:off x="298978" y="1651815"/>
+            <a:ext cx="5596995" cy="4318453"/>
+          </a:xfrm>
+          <a:prstGeom prst="rect">
+            <a:avLst/>
+          </a:prstGeom>
+        </p:spPr>
+      </p:pic>
+      <p:pic>
+        <p:nvPicPr>
+          <p:cNvPr id="7" name="Picture 6" descr="Chart, line chart&#10;&#10;Description automatically generated">
+            <a:extLst>
+              <a:ext uri="{FF2B5EF4-FFF2-40B4-BE49-F238E27FC236}">
+                <a16:creationId xmlns:a16="http://schemas.microsoft.com/office/drawing/2014/main" id="{C2E3D4E4-B2A5-4181-A025-F11D7E222D06}"/>
+              </a:ext>
+            </a:extLst>
+          </p:cNvPr>
+          <p:cNvPicPr>
+            <a:picLocks noChangeAspect="1"/>
+          </p:cNvPicPr>
+          <p:nvPr/>
+        </p:nvPicPr>
+        <p:blipFill rotWithShape="1">
+          <a:blip r:embed="rId3">
+            <a:extLst>
+              <a:ext uri="{28A0092B-C50C-407E-A947-70E740481C1C}">
+                <a14:useLocalDpi xmlns:a14="http://schemas.microsoft.com/office/drawing/2010/main" val="0"/>
+              </a:ext>
+            </a:extLst>
+          </a:blip>
+          <a:srcRect l="10416" t="9445" r="8959" b="7328"/>
+          <a:stretch/>
+        </p:blipFill>
+        <p:spPr>
+          <a:xfrm>
+            <a:off x="6315110" y="1651815"/>
+            <a:ext cx="5577912" cy="4318453"/>
+          </a:xfrm>
+          <a:prstGeom prst="rect">
+            <a:avLst/>
+          </a:prstGeom>
+        </p:spPr>
+      </p:pic>
+    </p:spTree>
+    <p:extLst>
+      <p:ext uri="{BB962C8B-B14F-4D97-AF65-F5344CB8AC3E}">
+        <p14:creationId xmlns:p14="http://schemas.microsoft.com/office/powerpoint/2010/main" val="1067804542"/>
+      </p:ext>
+    </p:extLst>
+  </p:cSld>
+  <p:clrMapOvr>
+    <a:masterClrMapping/>
+  </p:clrMapOvr>
+</p:sld>
+</file>
+
+<file path=ppt/slides/slide16.xml><?xml version="1.0" encoding="utf-8"?>
+<p:sld xmlns:a="http://schemas.openxmlformats.org/drawingml/2006/main" xmlns:r="http://schemas.openxmlformats.org/officeDocument/2006/relationships" xmlns:p="http://schemas.openxmlformats.org/presentationml/2006/main">
+  <p:cSld>
+    <p:spTree>
+      <p:nvGrpSpPr>
+        <p:cNvPr id="1" name=""/>
+        <p:cNvGrpSpPr/>
+        <p:nvPr/>
+      </p:nvGrpSpPr>
+      <p:grpSpPr>
+        <a:xfrm>
+          <a:off x="0" y="0"/>
+          <a:ext cx="0" cy="0"/>
+          <a:chOff x="0" y="0"/>
+          <a:chExt cx="0" cy="0"/>
+        </a:xfrm>
+      </p:grpSpPr>
+      <p:sp>
+        <p:nvSpPr>
+          <p:cNvPr id="5" name="TextBox 4">
+            <a:extLst>
+              <a:ext uri="{FF2B5EF4-FFF2-40B4-BE49-F238E27FC236}">
+                <a16:creationId xmlns:a16="http://schemas.microsoft.com/office/drawing/2014/main" id="{13BEAA79-A8D6-45DE-B737-2BB38ECE669C}"/>
+              </a:ext>
+            </a:extLst>
+          </p:cNvPr>
+          <p:cNvSpPr txBox="1"/>
+          <p:nvPr/>
+        </p:nvSpPr>
+        <p:spPr>
+          <a:xfrm>
+            <a:off x="202242" y="89566"/>
+            <a:ext cx="4504545" cy="461665"/>
+          </a:xfrm>
+          <a:prstGeom prst="rect">
+            <a:avLst/>
+          </a:prstGeom>
+          <a:noFill/>
+        </p:spPr>
+        <p:txBody>
+          <a:bodyPr wrap="square" rtlCol="0">
+            <a:spAutoFit/>
+          </a:bodyPr>
+          <a:lstStyle/>
+          <a:p>
+            <a:r>
+              <a:rPr lang="en-US" sz="2400" b="1" dirty="0"/>
+              <a:t>Results</a:t>
+            </a:r>
+            <a:endParaRPr lang="en-SG" sz="2400" b="1" dirty="0"/>
+          </a:p>
+        </p:txBody>
+      </p:sp>
+      <p:cxnSp>
+        <p:nvCxnSpPr>
+          <p:cNvPr id="9" name="Straight Connector 8">
+            <a:extLst>
+              <a:ext uri="{FF2B5EF4-FFF2-40B4-BE49-F238E27FC236}">
+                <a16:creationId xmlns:a16="http://schemas.microsoft.com/office/drawing/2014/main" id="{F0F31EF4-F02A-44E0-8175-1D943745BBE4}"/>
+              </a:ext>
+            </a:extLst>
+          </p:cNvPr>
+          <p:cNvCxnSpPr/>
+          <p:nvPr/>
+        </p:nvCxnSpPr>
+        <p:spPr>
+          <a:xfrm>
+            <a:off x="6125337" y="886573"/>
+            <a:ext cx="0" cy="5684096"/>
+          </a:xfrm>
+          <a:prstGeom prst="line">
+            <a:avLst/>
+          </a:prstGeom>
+          <a:ln w="19050">
+            <a:solidFill>
+              <a:schemeClr val="tx1"/>
+            </a:solidFill>
+            <a:prstDash val="lgDashDot"/>
+          </a:ln>
+        </p:spPr>
+        <p:style>
+          <a:lnRef idx="1">
+            <a:schemeClr val="accent1"/>
+          </a:lnRef>
+          <a:fillRef idx="0">
+            <a:schemeClr val="accent1"/>
+          </a:fillRef>
+          <a:effectRef idx="0">
+            <a:schemeClr val="accent1"/>
+          </a:effectRef>
+          <a:fontRef idx="minor">
+            <a:schemeClr val="tx1"/>
+          </a:fontRef>
+        </p:style>
+      </p:cxnSp>
+      <p:cxnSp>
+        <p:nvCxnSpPr>
+          <p:cNvPr id="11" name="Straight Connector 10">
+            <a:extLst>
+              <a:ext uri="{FF2B5EF4-FFF2-40B4-BE49-F238E27FC236}">
+                <a16:creationId xmlns:a16="http://schemas.microsoft.com/office/drawing/2014/main" id="{71B88A5D-4593-4C4D-964A-ACA6B75E3A7D}"/>
+              </a:ext>
+            </a:extLst>
+          </p:cNvPr>
+          <p:cNvCxnSpPr>
+            <a:cxnSpLocks/>
+          </p:cNvCxnSpPr>
+          <p:nvPr/>
+        </p:nvCxnSpPr>
+        <p:spPr>
+          <a:xfrm flipH="1" flipV="1">
+            <a:off x="266698" y="886573"/>
+            <a:ext cx="11372850" cy="4762"/>
+          </a:xfrm>
+          <a:prstGeom prst="line">
+            <a:avLst/>
+          </a:prstGeom>
+          <a:ln w="19050">
+            <a:solidFill>
+              <a:schemeClr val="tx1"/>
+            </a:solidFill>
+            <a:prstDash val="lgDashDot"/>
+          </a:ln>
+        </p:spPr>
+        <p:style>
+          <a:lnRef idx="1">
+            <a:schemeClr val="accent1"/>
+          </a:lnRef>
+          <a:fillRef idx="0">
+            <a:schemeClr val="accent1"/>
+          </a:fillRef>
+          <a:effectRef idx="0">
+            <a:schemeClr val="accent1"/>
+          </a:effectRef>
+          <a:fontRef idx="minor">
+            <a:schemeClr val="tx1"/>
+          </a:fontRef>
+        </p:style>
+      </p:cxnSp>
+      <p:sp>
+        <p:nvSpPr>
+          <p:cNvPr id="14" name="TextBox 13">
+            <a:extLst>
+              <a:ext uri="{FF2B5EF4-FFF2-40B4-BE49-F238E27FC236}">
+                <a16:creationId xmlns:a16="http://schemas.microsoft.com/office/drawing/2014/main" id="{FB315EF9-E5E8-4EBB-8AB0-19C14560B397}"/>
+              </a:ext>
+            </a:extLst>
+          </p:cNvPr>
+          <p:cNvSpPr txBox="1"/>
+          <p:nvPr/>
+        </p:nvSpPr>
+        <p:spPr>
+          <a:xfrm>
+            <a:off x="1792135" y="982210"/>
+            <a:ext cx="2792731" cy="338554"/>
+          </a:xfrm>
+          <a:prstGeom prst="rect">
+            <a:avLst/>
+          </a:prstGeom>
+          <a:noFill/>
+        </p:spPr>
+        <p:txBody>
+          <a:bodyPr wrap="square" rtlCol="0">
+            <a:spAutoFit/>
+          </a:bodyPr>
+          <a:lstStyle/>
+          <a:p>
+            <a:pPr algn="ctr"/>
+            <a:r>
+              <a:rPr lang="en-US" sz="1600" b="1" dirty="0"/>
+              <a:t>N-CAMPSS_DS04.h5</a:t>
+            </a:r>
+          </a:p>
+        </p:txBody>
+      </p:sp>
+      <p:sp>
+        <p:nvSpPr>
+          <p:cNvPr id="15" name="TextBox 14">
+            <a:extLst>
+              <a:ext uri="{FF2B5EF4-FFF2-40B4-BE49-F238E27FC236}">
+                <a16:creationId xmlns:a16="http://schemas.microsoft.com/office/drawing/2014/main" id="{6CE3865A-6C5A-424F-B922-CF53D91F1913}"/>
+              </a:ext>
+            </a:extLst>
+          </p:cNvPr>
+          <p:cNvSpPr txBox="1"/>
+          <p:nvPr/>
+        </p:nvSpPr>
+        <p:spPr>
+          <a:xfrm>
+            <a:off x="7607134" y="982210"/>
+            <a:ext cx="2792731" cy="338554"/>
+          </a:xfrm>
+          <a:prstGeom prst="rect">
+            <a:avLst/>
+          </a:prstGeom>
+          <a:noFill/>
+        </p:spPr>
+        <p:txBody>
+          <a:bodyPr wrap="square" rtlCol="0">
+            <a:spAutoFit/>
+          </a:bodyPr>
+          <a:lstStyle/>
+          <a:p>
+            <a:pPr algn="ctr"/>
+            <a:r>
+              <a:rPr lang="en-US" sz="1600" b="1" dirty="0"/>
+              <a:t>N-CAMPSS_DS05.h5</a:t>
+            </a:r>
+          </a:p>
+        </p:txBody>
+      </p:sp>
+      <p:sp>
+        <p:nvSpPr>
+          <p:cNvPr id="17" name="TextBox 16">
+            <a:extLst>
+              <a:ext uri="{FF2B5EF4-FFF2-40B4-BE49-F238E27FC236}">
+                <a16:creationId xmlns:a16="http://schemas.microsoft.com/office/drawing/2014/main" id="{D2B8853A-4C8A-4C77-B070-867040F95000}"/>
+              </a:ext>
+            </a:extLst>
+          </p:cNvPr>
+          <p:cNvSpPr txBox="1"/>
+          <p:nvPr/>
+        </p:nvSpPr>
+        <p:spPr>
+          <a:xfrm>
+            <a:off x="1459213" y="6111899"/>
+            <a:ext cx="3458573" cy="338554"/>
+          </a:xfrm>
+          <a:prstGeom prst="rect">
+            <a:avLst/>
+          </a:prstGeom>
+          <a:noFill/>
+        </p:spPr>
+        <p:txBody>
+          <a:bodyPr wrap="square">
+            <a:spAutoFit/>
+          </a:bodyPr>
+          <a:lstStyle/>
+          <a:p>
+            <a:pPr algn="ctr"/>
+            <a:r>
+              <a:rPr lang="en-SG" sz="1600" dirty="0"/>
+              <a:t>RMSE: 8.7607 </a:t>
+            </a:r>
+          </a:p>
+        </p:txBody>
+      </p:sp>
+      <p:sp>
+        <p:nvSpPr>
+          <p:cNvPr id="18" name="TextBox 17">
+            <a:extLst>
+              <a:ext uri="{FF2B5EF4-FFF2-40B4-BE49-F238E27FC236}">
+                <a16:creationId xmlns:a16="http://schemas.microsoft.com/office/drawing/2014/main" id="{48C9C2D3-343F-467C-925B-29AB62D7FBF2}"/>
+              </a:ext>
+            </a:extLst>
+          </p:cNvPr>
+          <p:cNvSpPr txBox="1"/>
+          <p:nvPr/>
+        </p:nvSpPr>
+        <p:spPr>
+          <a:xfrm>
+            <a:off x="7332889" y="6111899"/>
+            <a:ext cx="3458573" cy="338554"/>
+          </a:xfrm>
+          <a:prstGeom prst="rect">
+            <a:avLst/>
+          </a:prstGeom>
+          <a:noFill/>
+        </p:spPr>
+        <p:txBody>
+          <a:bodyPr wrap="square">
+            <a:spAutoFit/>
+          </a:bodyPr>
+          <a:lstStyle/>
+          <a:p>
+            <a:pPr algn="ctr"/>
+            <a:r>
+              <a:rPr lang="en-SG" sz="1600" dirty="0"/>
+              <a:t>RMSE: 8.9196</a:t>
+            </a:r>
+          </a:p>
+        </p:txBody>
+      </p:sp>
+      <p:sp>
+        <p:nvSpPr>
+          <p:cNvPr id="12" name="TextBox 11">
+            <a:extLst>
+              <a:ext uri="{FF2B5EF4-FFF2-40B4-BE49-F238E27FC236}">
+                <a16:creationId xmlns:a16="http://schemas.microsoft.com/office/drawing/2014/main" id="{908D7C9B-31BB-4702-9C13-A5260CE59C05}"/>
+              </a:ext>
+            </a:extLst>
+          </p:cNvPr>
+          <p:cNvSpPr txBox="1"/>
+          <p:nvPr/>
+        </p:nvSpPr>
+        <p:spPr>
+          <a:xfrm>
+            <a:off x="-227457" y="502582"/>
+            <a:ext cx="11257788" cy="338554"/>
+          </a:xfrm>
+          <a:prstGeom prst="rect">
+            <a:avLst/>
+          </a:prstGeom>
+          <a:noFill/>
+        </p:spPr>
+        <p:txBody>
+          <a:bodyPr wrap="square">
+            <a:spAutoFit/>
+          </a:bodyPr>
+          <a:lstStyle/>
+          <a:p>
+            <a:pPr marL="0" marR="0" lvl="0" indent="0" algn="ctr" defTabSz="914400" rtl="0" eaLnBrk="1" fontAlgn="auto" latinLnBrk="0" hangingPunct="1">
+              <a:lnSpc>
+                <a:spcPct val="100000"/>
+              </a:lnSpc>
+              <a:spcBef>
+                <a:spcPts val="0"/>
+              </a:spcBef>
+              <a:spcAft>
+                <a:spcPts val="0"/>
+              </a:spcAft>
+              <a:buClrTx/>
+              <a:buSzTx/>
+              <a:buFontTx/>
+              <a:buNone/>
+              <a:tabLst/>
+              <a:defRPr/>
+            </a:pPr>
+            <a:r>
+              <a:rPr lang="en-SG" sz="1600" b="1" dirty="0"/>
+              <a:t>Ridge regression model (with lag features) trained on N-CAMPSS_DS01-005.h5 performing inference on test dataset from: </a:t>
+            </a:r>
+          </a:p>
+        </p:txBody>
+      </p:sp>
+      <p:pic>
+        <p:nvPicPr>
+          <p:cNvPr id="3" name="Picture 2" descr="Chart, line chart&#10;&#10;Description automatically generated">
+            <a:extLst>
+              <a:ext uri="{FF2B5EF4-FFF2-40B4-BE49-F238E27FC236}">
+                <a16:creationId xmlns:a16="http://schemas.microsoft.com/office/drawing/2014/main" id="{D0594B4E-77EE-4BDF-8D97-242B712C7959}"/>
+              </a:ext>
+            </a:extLst>
+          </p:cNvPr>
+          <p:cNvPicPr>
+            <a:picLocks noChangeAspect="1"/>
+          </p:cNvPicPr>
+          <p:nvPr/>
+        </p:nvPicPr>
+        <p:blipFill rotWithShape="1">
+          <a:blip r:embed="rId2">
+            <a:extLst>
+              <a:ext uri="{28A0092B-C50C-407E-A947-70E740481C1C}">
+                <a14:useLocalDpi xmlns:a14="http://schemas.microsoft.com/office/drawing/2010/main" val="0"/>
+              </a:ext>
+            </a:extLst>
+          </a:blip>
+          <a:srcRect l="10104" t="9306" r="8542" b="7328"/>
+          <a:stretch/>
+        </p:blipFill>
+        <p:spPr>
+          <a:xfrm>
+            <a:off x="303555" y="1622081"/>
+            <a:ext cx="5659177" cy="4349346"/>
+          </a:xfrm>
+          <a:prstGeom prst="rect">
+            <a:avLst/>
+          </a:prstGeom>
+        </p:spPr>
+      </p:pic>
+      <p:pic>
+        <p:nvPicPr>
+          <p:cNvPr id="6" name="Picture 5" descr="Chart, line chart&#10;&#10;Description automatically generated">
+            <a:extLst>
+              <a:ext uri="{FF2B5EF4-FFF2-40B4-BE49-F238E27FC236}">
+                <a16:creationId xmlns:a16="http://schemas.microsoft.com/office/drawing/2014/main" id="{1CF0B0BF-554D-4BE8-A9D6-8B61F046A13F}"/>
+              </a:ext>
+            </a:extLst>
+          </p:cNvPr>
+          <p:cNvPicPr>
+            <a:picLocks noChangeAspect="1"/>
+          </p:cNvPicPr>
+          <p:nvPr/>
+        </p:nvPicPr>
+        <p:blipFill rotWithShape="1">
+          <a:blip r:embed="rId3">
+            <a:extLst>
+              <a:ext uri="{28A0092B-C50C-407E-A947-70E740481C1C}">
+                <a14:useLocalDpi xmlns:a14="http://schemas.microsoft.com/office/drawing/2010/main" val="0"/>
+              </a:ext>
+            </a:extLst>
+          </a:blip>
+          <a:srcRect l="10250" t="9180" r="8584" b="7328"/>
+          <a:stretch/>
+        </p:blipFill>
+        <p:spPr>
+          <a:xfrm>
+            <a:off x="6352468" y="1629700"/>
+            <a:ext cx="5625337" cy="4339823"/>
+          </a:xfrm>
+          <a:prstGeom prst="rect">
+            <a:avLst/>
+          </a:prstGeom>
+        </p:spPr>
+      </p:pic>
+    </p:spTree>
+    <p:extLst>
+      <p:ext uri="{BB962C8B-B14F-4D97-AF65-F5344CB8AC3E}">
+        <p14:creationId xmlns:p14="http://schemas.microsoft.com/office/powerpoint/2010/main" val="1049807320"/>
+      </p:ext>
+    </p:extLst>
+  </p:cSld>
+  <p:clrMapOvr>
+    <a:masterClrMapping/>
+  </p:clrMapOvr>
+</p:sld>
+</file>
+
+<file path=ppt/slides/slide17.xml><?xml version="1.0" encoding="utf-8"?>
+<p:sld xmlns:a="http://schemas.openxmlformats.org/drawingml/2006/main" xmlns:r="http://schemas.openxmlformats.org/officeDocument/2006/relationships" xmlns:p="http://schemas.openxmlformats.org/presentationml/2006/main">
+  <p:cSld>
+    <p:spTree>
+      <p:nvGrpSpPr>
+        <p:cNvPr id="1" name=""/>
+        <p:cNvGrpSpPr/>
+        <p:nvPr/>
+      </p:nvGrpSpPr>
+      <p:grpSpPr>
+        <a:xfrm>
+          <a:off x="0" y="0"/>
+          <a:ext cx="0" cy="0"/>
+          <a:chOff x="0" y="0"/>
+          <a:chExt cx="0" cy="0"/>
+        </a:xfrm>
+      </p:grpSpPr>
+      <p:sp>
+        <p:nvSpPr>
+          <p:cNvPr id="5" name="TextBox 4">
+            <a:extLst>
+              <a:ext uri="{FF2B5EF4-FFF2-40B4-BE49-F238E27FC236}">
+                <a16:creationId xmlns:a16="http://schemas.microsoft.com/office/drawing/2014/main" id="{13BEAA79-A8D6-45DE-B737-2BB38ECE669C}"/>
+              </a:ext>
+            </a:extLst>
+          </p:cNvPr>
+          <p:cNvSpPr txBox="1"/>
+          <p:nvPr/>
+        </p:nvSpPr>
+        <p:spPr>
+          <a:xfrm>
+            <a:off x="202242" y="89566"/>
+            <a:ext cx="4504545" cy="461665"/>
+          </a:xfrm>
+          <a:prstGeom prst="rect">
+            <a:avLst/>
+          </a:prstGeom>
+          <a:noFill/>
+        </p:spPr>
+        <p:txBody>
+          <a:bodyPr wrap="square" rtlCol="0">
+            <a:spAutoFit/>
+          </a:bodyPr>
+          <a:lstStyle/>
+          <a:p>
+            <a:r>
+              <a:rPr lang="en-US" sz="2400" b="1" dirty="0"/>
+              <a:t>Results</a:t>
+            </a:r>
+            <a:endParaRPr lang="en-SG" sz="2400" b="1" dirty="0"/>
+          </a:p>
+        </p:txBody>
+      </p:sp>
+      <p:cxnSp>
+        <p:nvCxnSpPr>
+          <p:cNvPr id="9" name="Straight Connector 8">
+            <a:extLst>
+              <a:ext uri="{FF2B5EF4-FFF2-40B4-BE49-F238E27FC236}">
+                <a16:creationId xmlns:a16="http://schemas.microsoft.com/office/drawing/2014/main" id="{F0F31EF4-F02A-44E0-8175-1D943745BBE4}"/>
+              </a:ext>
+            </a:extLst>
+          </p:cNvPr>
+          <p:cNvCxnSpPr/>
+          <p:nvPr/>
+        </p:nvCxnSpPr>
+        <p:spPr>
+          <a:xfrm>
+            <a:off x="6125337" y="886573"/>
+            <a:ext cx="0" cy="5684096"/>
+          </a:xfrm>
+          <a:prstGeom prst="line">
+            <a:avLst/>
+          </a:prstGeom>
+          <a:ln w="19050">
+            <a:solidFill>
+              <a:schemeClr val="tx1"/>
+            </a:solidFill>
+            <a:prstDash val="lgDashDot"/>
+          </a:ln>
+        </p:spPr>
+        <p:style>
+          <a:lnRef idx="1">
+            <a:schemeClr val="accent1"/>
+          </a:lnRef>
+          <a:fillRef idx="0">
+            <a:schemeClr val="accent1"/>
+          </a:fillRef>
+          <a:effectRef idx="0">
+            <a:schemeClr val="accent1"/>
+          </a:effectRef>
+          <a:fontRef idx="minor">
+            <a:schemeClr val="tx1"/>
+          </a:fontRef>
+        </p:style>
+      </p:cxnSp>
+      <p:cxnSp>
+        <p:nvCxnSpPr>
+          <p:cNvPr id="11" name="Straight Connector 10">
+            <a:extLst>
+              <a:ext uri="{FF2B5EF4-FFF2-40B4-BE49-F238E27FC236}">
+                <a16:creationId xmlns:a16="http://schemas.microsoft.com/office/drawing/2014/main" id="{71B88A5D-4593-4C4D-964A-ACA6B75E3A7D}"/>
+              </a:ext>
+            </a:extLst>
+          </p:cNvPr>
+          <p:cNvCxnSpPr>
+            <a:cxnSpLocks/>
+          </p:cNvCxnSpPr>
+          <p:nvPr/>
+        </p:nvCxnSpPr>
+        <p:spPr>
+          <a:xfrm flipH="1" flipV="1">
+            <a:off x="266698" y="886573"/>
+            <a:ext cx="11372850" cy="4762"/>
+          </a:xfrm>
+          <a:prstGeom prst="line">
+            <a:avLst/>
+          </a:prstGeom>
+          <a:ln w="19050">
+            <a:solidFill>
+              <a:schemeClr val="tx1"/>
+            </a:solidFill>
+            <a:prstDash val="lgDashDot"/>
+          </a:ln>
+        </p:spPr>
+        <p:style>
+          <a:lnRef idx="1">
+            <a:schemeClr val="accent1"/>
+          </a:lnRef>
+          <a:fillRef idx="0">
+            <a:schemeClr val="accent1"/>
+          </a:fillRef>
+          <a:effectRef idx="0">
+            <a:schemeClr val="accent1"/>
+          </a:effectRef>
+          <a:fontRef idx="minor">
+            <a:schemeClr val="tx1"/>
+          </a:fontRef>
+        </p:style>
+      </p:cxnSp>
+      <p:sp>
+        <p:nvSpPr>
+          <p:cNvPr id="14" name="TextBox 13">
+            <a:extLst>
+              <a:ext uri="{FF2B5EF4-FFF2-40B4-BE49-F238E27FC236}">
+                <a16:creationId xmlns:a16="http://schemas.microsoft.com/office/drawing/2014/main" id="{FB315EF9-E5E8-4EBB-8AB0-19C14560B397}"/>
+              </a:ext>
+            </a:extLst>
+          </p:cNvPr>
+          <p:cNvSpPr txBox="1"/>
+          <p:nvPr/>
+        </p:nvSpPr>
+        <p:spPr>
+          <a:xfrm>
+            <a:off x="1792135" y="982210"/>
+            <a:ext cx="2792731" cy="338554"/>
+          </a:xfrm>
+          <a:prstGeom prst="rect">
+            <a:avLst/>
+          </a:prstGeom>
+          <a:noFill/>
+        </p:spPr>
+        <p:txBody>
+          <a:bodyPr wrap="square" rtlCol="0">
+            <a:spAutoFit/>
+          </a:bodyPr>
+          <a:lstStyle/>
+          <a:p>
+            <a:pPr algn="ctr"/>
+            <a:r>
+              <a:rPr lang="en-US" sz="1600" b="1" dirty="0"/>
+              <a:t>N-CAMPSS_DS06.h5</a:t>
+            </a:r>
+          </a:p>
+        </p:txBody>
+      </p:sp>
+      <p:sp>
+        <p:nvSpPr>
+          <p:cNvPr id="15" name="TextBox 14">
+            <a:extLst>
+              <a:ext uri="{FF2B5EF4-FFF2-40B4-BE49-F238E27FC236}">
+                <a16:creationId xmlns:a16="http://schemas.microsoft.com/office/drawing/2014/main" id="{6CE3865A-6C5A-424F-B922-CF53D91F1913}"/>
+              </a:ext>
+            </a:extLst>
+          </p:cNvPr>
+          <p:cNvSpPr txBox="1"/>
+          <p:nvPr/>
+        </p:nvSpPr>
+        <p:spPr>
+          <a:xfrm>
+            <a:off x="7607134" y="982210"/>
+            <a:ext cx="2792731" cy="338554"/>
+          </a:xfrm>
+          <a:prstGeom prst="rect">
+            <a:avLst/>
+          </a:prstGeom>
+          <a:noFill/>
+        </p:spPr>
+        <p:txBody>
+          <a:bodyPr wrap="square" rtlCol="0">
+            <a:spAutoFit/>
+          </a:bodyPr>
+          <a:lstStyle/>
+          <a:p>
+            <a:pPr algn="ctr"/>
+            <a:r>
+              <a:rPr lang="en-US" sz="1600" b="1" dirty="0"/>
+              <a:t>N-CAMPSS_DS07.h5</a:t>
+            </a:r>
+          </a:p>
+        </p:txBody>
+      </p:sp>
+      <p:sp>
+        <p:nvSpPr>
+          <p:cNvPr id="17" name="TextBox 16">
+            <a:extLst>
+              <a:ext uri="{FF2B5EF4-FFF2-40B4-BE49-F238E27FC236}">
+                <a16:creationId xmlns:a16="http://schemas.microsoft.com/office/drawing/2014/main" id="{D2B8853A-4C8A-4C77-B070-867040F95000}"/>
+              </a:ext>
+            </a:extLst>
+          </p:cNvPr>
+          <p:cNvSpPr txBox="1"/>
+          <p:nvPr/>
+        </p:nvSpPr>
+        <p:spPr>
+          <a:xfrm>
+            <a:off x="1459213" y="6111899"/>
+            <a:ext cx="3458573" cy="338554"/>
+          </a:xfrm>
+          <a:prstGeom prst="rect">
+            <a:avLst/>
+          </a:prstGeom>
+          <a:noFill/>
+        </p:spPr>
+        <p:txBody>
+          <a:bodyPr wrap="square">
+            <a:spAutoFit/>
+          </a:bodyPr>
+          <a:lstStyle/>
+          <a:p>
+            <a:pPr algn="ctr"/>
+            <a:r>
+              <a:rPr lang="en-SG" sz="1600" dirty="0"/>
+              <a:t>RMSE: 10.9219</a:t>
+            </a:r>
+          </a:p>
+        </p:txBody>
+      </p:sp>
+      <p:sp>
+        <p:nvSpPr>
+          <p:cNvPr id="18" name="TextBox 17">
+            <a:extLst>
+              <a:ext uri="{FF2B5EF4-FFF2-40B4-BE49-F238E27FC236}">
+                <a16:creationId xmlns:a16="http://schemas.microsoft.com/office/drawing/2014/main" id="{48C9C2D3-343F-467C-925B-29AB62D7FBF2}"/>
+              </a:ext>
+            </a:extLst>
+          </p:cNvPr>
+          <p:cNvSpPr txBox="1"/>
+          <p:nvPr/>
+        </p:nvSpPr>
+        <p:spPr>
+          <a:xfrm>
+            <a:off x="7332889" y="6111899"/>
+            <a:ext cx="3458573" cy="338554"/>
+          </a:xfrm>
+          <a:prstGeom prst="rect">
+            <a:avLst/>
+          </a:prstGeom>
+          <a:noFill/>
+        </p:spPr>
+        <p:txBody>
+          <a:bodyPr wrap="square">
+            <a:spAutoFit/>
+          </a:bodyPr>
+          <a:lstStyle/>
+          <a:p>
+            <a:pPr algn="ctr"/>
+            <a:r>
+              <a:rPr lang="en-SG" sz="1600" dirty="0"/>
+              <a:t>RMSE: 8.2998</a:t>
+            </a:r>
+          </a:p>
+        </p:txBody>
+      </p:sp>
+      <p:sp>
+        <p:nvSpPr>
+          <p:cNvPr id="12" name="TextBox 11">
+            <a:extLst>
+              <a:ext uri="{FF2B5EF4-FFF2-40B4-BE49-F238E27FC236}">
+                <a16:creationId xmlns:a16="http://schemas.microsoft.com/office/drawing/2014/main" id="{73B31FA2-59E4-4F8B-9401-8778004EC634}"/>
+              </a:ext>
+            </a:extLst>
+          </p:cNvPr>
+          <p:cNvSpPr txBox="1"/>
+          <p:nvPr/>
+        </p:nvSpPr>
+        <p:spPr>
+          <a:xfrm>
+            <a:off x="-227457" y="502582"/>
+            <a:ext cx="11257788" cy="338554"/>
+          </a:xfrm>
+          <a:prstGeom prst="rect">
+            <a:avLst/>
+          </a:prstGeom>
+          <a:noFill/>
+        </p:spPr>
+        <p:txBody>
+          <a:bodyPr wrap="square">
+            <a:spAutoFit/>
+          </a:bodyPr>
+          <a:lstStyle/>
+          <a:p>
+            <a:pPr marL="0" marR="0" lvl="0" indent="0" algn="ctr" defTabSz="914400" rtl="0" eaLnBrk="1" fontAlgn="auto" latinLnBrk="0" hangingPunct="1">
+              <a:lnSpc>
+                <a:spcPct val="100000"/>
+              </a:lnSpc>
+              <a:spcBef>
+                <a:spcPts val="0"/>
+              </a:spcBef>
+              <a:spcAft>
+                <a:spcPts val="0"/>
+              </a:spcAft>
+              <a:buClrTx/>
+              <a:buSzTx/>
+              <a:buFontTx/>
+              <a:buNone/>
+              <a:tabLst/>
+              <a:defRPr/>
+            </a:pPr>
+            <a:r>
+              <a:rPr lang="en-SG" sz="1600" b="1" dirty="0"/>
+              <a:t>Ridge regression model (with lag features) trained on N-CAMPSS_DS01-005.h5 performing inference on test dataset from: </a:t>
+            </a:r>
+          </a:p>
+        </p:txBody>
+      </p:sp>
+      <p:pic>
+        <p:nvPicPr>
+          <p:cNvPr id="3" name="Picture 2" descr="Chart, line chart&#10;&#10;Description automatically generated">
+            <a:extLst>
+              <a:ext uri="{FF2B5EF4-FFF2-40B4-BE49-F238E27FC236}">
+                <a16:creationId xmlns:a16="http://schemas.microsoft.com/office/drawing/2014/main" id="{6328147B-3F08-45AB-872C-85AE386C63B5}"/>
+              </a:ext>
+            </a:extLst>
+          </p:cNvPr>
+          <p:cNvPicPr>
+            <a:picLocks noChangeAspect="1"/>
+          </p:cNvPicPr>
+          <p:nvPr/>
+        </p:nvPicPr>
+        <p:blipFill rotWithShape="1">
+          <a:blip r:embed="rId2">
+            <a:extLst>
+              <a:ext uri="{28A0092B-C50C-407E-A947-70E740481C1C}">
+                <a14:useLocalDpi xmlns:a14="http://schemas.microsoft.com/office/drawing/2010/main" val="0"/>
+              </a:ext>
+            </a:extLst>
+          </a:blip>
+          <a:srcRect l="10333" t="9249" r="8917" b="7329"/>
+          <a:stretch/>
+        </p:blipFill>
+        <p:spPr>
+          <a:xfrm>
+            <a:off x="158007" y="1476523"/>
+            <a:ext cx="5755113" cy="4459141"/>
+          </a:xfrm>
+          <a:prstGeom prst="rect">
+            <a:avLst/>
+          </a:prstGeom>
+        </p:spPr>
+      </p:pic>
+      <p:pic>
+        <p:nvPicPr>
+          <p:cNvPr id="6" name="Picture 5" descr="Chart, line chart&#10;&#10;Description automatically generated">
+            <a:extLst>
+              <a:ext uri="{FF2B5EF4-FFF2-40B4-BE49-F238E27FC236}">
+                <a16:creationId xmlns:a16="http://schemas.microsoft.com/office/drawing/2014/main" id="{D8F22B0B-9D5A-4C76-9BC1-69C4B618E9EF}"/>
+              </a:ext>
+            </a:extLst>
+          </p:cNvPr>
+          <p:cNvPicPr>
+            <a:picLocks noChangeAspect="1"/>
+          </p:cNvPicPr>
+          <p:nvPr/>
+        </p:nvPicPr>
+        <p:blipFill rotWithShape="1">
+          <a:blip r:embed="rId3">
+            <a:extLst>
+              <a:ext uri="{28A0092B-C50C-407E-A947-70E740481C1C}">
+                <a14:useLocalDpi xmlns:a14="http://schemas.microsoft.com/office/drawing/2010/main" val="0"/>
+              </a:ext>
+            </a:extLst>
+          </a:blip>
+          <a:srcRect l="10250" t="10069" r="8584" b="7937"/>
+          <a:stretch/>
+        </p:blipFill>
+        <p:spPr>
+          <a:xfrm>
+            <a:off x="6301678" y="1524906"/>
+            <a:ext cx="5796600" cy="4391754"/>
+          </a:xfrm>
+          <a:prstGeom prst="rect">
+            <a:avLst/>
+          </a:prstGeom>
+        </p:spPr>
+      </p:pic>
+    </p:spTree>
+    <p:extLst>
+      <p:ext uri="{BB962C8B-B14F-4D97-AF65-F5344CB8AC3E}">
+        <p14:creationId xmlns:p14="http://schemas.microsoft.com/office/powerpoint/2010/main" val="3061861195"/>
+      </p:ext>
+    </p:extLst>
+  </p:cSld>
+  <p:clrMapOvr>
+    <a:masterClrMapping/>
+  </p:clrMapOvr>
+</p:sld>
+</file>
+
+<file path=ppt/slides/slide18.xml><?xml version="1.0" encoding="utf-8"?>
 <p:sld xmlns:a="http://schemas.openxmlformats.org/drawingml/2006/main" xmlns:r="http://schemas.openxmlformats.org/officeDocument/2006/relationships" xmlns:p="http://schemas.openxmlformats.org/presentationml/2006/main">
   <p:cSld>
     <p:spTree>

</xml_diff>